<commit_message>
Save data files and nbks 09/03 7:14pm
</commit_message>
<xml_diff>
--- a/PowerPoint/Data visualization & Analytics_chrisg.pptx
+++ b/PowerPoint/Data visualization & Analytics_chrisg.pptx
@@ -307,7 +307,7 @@
             <a:fld id="{48A87A34-81AB-432B-8DAE-1953F412C126}" type="datetimeFigureOut">
               <a:rPr lang="en-US" smtClean="0"/>
               <a:pPr/>
-              <a:t>9/2/2017</a:t>
+              <a:t>9/3/2017</a:t>
             </a:fld>
             <a:endParaRPr lang="en-US" dirty="0"/>
           </a:p>
@@ -624,7 +624,7 @@
             <a:fld id="{48A87A34-81AB-432B-8DAE-1953F412C126}" type="datetimeFigureOut">
               <a:rPr lang="en-US" smtClean="0"/>
               <a:pPr/>
-              <a:t>9/2/2017</a:t>
+              <a:t>9/3/2017</a:t>
             </a:fld>
             <a:endParaRPr lang="en-US" dirty="0"/>
           </a:p>
@@ -848,7 +848,7 @@
             <a:fld id="{48A87A34-81AB-432B-8DAE-1953F412C126}" type="datetimeFigureOut">
               <a:rPr lang="en-US" smtClean="0"/>
               <a:pPr/>
-              <a:t>9/2/2017</a:t>
+              <a:t>9/3/2017</a:t>
             </a:fld>
             <a:endParaRPr lang="en-US" dirty="0"/>
           </a:p>
@@ -1141,7 +1141,7 @@
             <a:fld id="{48A87A34-81AB-432B-8DAE-1953F412C126}" type="datetimeFigureOut">
               <a:rPr lang="en-US" smtClean="0"/>
               <a:pPr/>
-              <a:t>9/2/2017</a:t>
+              <a:t>9/3/2017</a:t>
             </a:fld>
             <a:endParaRPr lang="en-US" dirty="0"/>
           </a:p>
@@ -1597,7 +1597,7 @@
             <a:fld id="{48A87A34-81AB-432B-8DAE-1953F412C126}" type="datetimeFigureOut">
               <a:rPr lang="en-US" smtClean="0"/>
               <a:pPr/>
-              <a:t>9/2/2017</a:t>
+              <a:t>9/3/2017</a:t>
             </a:fld>
             <a:endParaRPr lang="en-US" dirty="0"/>
           </a:p>
@@ -2175,7 +2175,7 @@
             <a:fld id="{48A87A34-81AB-432B-8DAE-1953F412C126}" type="datetimeFigureOut">
               <a:rPr lang="en-US" smtClean="0"/>
               <a:pPr/>
-              <a:t>9/2/2017</a:t>
+              <a:t>9/3/2017</a:t>
             </a:fld>
             <a:endParaRPr lang="en-US" dirty="0"/>
           </a:p>
@@ -3038,7 +3038,7 @@
             <a:fld id="{48A87A34-81AB-432B-8DAE-1953F412C126}" type="datetimeFigureOut">
               <a:rPr lang="en-US" smtClean="0"/>
               <a:pPr/>
-              <a:t>9/2/2017</a:t>
+              <a:t>9/3/2017</a:t>
             </a:fld>
             <a:endParaRPr lang="en-US" dirty="0"/>
           </a:p>
@@ -3245,7 +3245,7 @@
             <a:fld id="{48A87A34-81AB-432B-8DAE-1953F412C126}" type="datetimeFigureOut">
               <a:rPr lang="en-US" smtClean="0"/>
               <a:pPr/>
-              <a:t>9/2/2017</a:t>
+              <a:t>9/3/2017</a:t>
             </a:fld>
             <a:endParaRPr lang="en-US" dirty="0"/>
           </a:p>
@@ -3461,7 +3461,7 @@
             <a:fld id="{48A87A34-81AB-432B-8DAE-1953F412C126}" type="datetimeFigureOut">
               <a:rPr lang="en-US" smtClean="0"/>
               <a:pPr/>
-              <a:t>9/2/2017</a:t>
+              <a:t>9/3/2017</a:t>
             </a:fld>
             <a:endParaRPr lang="en-US" dirty="0"/>
           </a:p>
@@ -3668,7 +3668,7 @@
             <a:fld id="{48A87A34-81AB-432B-8DAE-1953F412C126}" type="datetimeFigureOut">
               <a:rPr lang="en-US" smtClean="0"/>
               <a:pPr/>
-              <a:t>9/2/2017</a:t>
+              <a:t>9/3/2017</a:t>
             </a:fld>
             <a:endParaRPr lang="en-US" dirty="0"/>
           </a:p>
@@ -3950,7 +3950,7 @@
             <a:fld id="{48A87A34-81AB-432B-8DAE-1953F412C126}" type="datetimeFigureOut">
               <a:rPr lang="en-US" smtClean="0"/>
               <a:pPr/>
-              <a:t>9/2/2017</a:t>
+              <a:t>9/3/2017</a:t>
             </a:fld>
             <a:endParaRPr lang="en-US" dirty="0"/>
           </a:p>
@@ -4219,7 +4219,7 @@
             <a:fld id="{48A87A34-81AB-432B-8DAE-1953F412C126}" type="datetimeFigureOut">
               <a:rPr lang="en-US" smtClean="0"/>
               <a:pPr/>
-              <a:t>9/2/2017</a:t>
+              <a:t>9/3/2017</a:t>
             </a:fld>
             <a:endParaRPr lang="en-US" dirty="0"/>
           </a:p>
@@ -4636,7 +4636,7 @@
             <a:fld id="{48A87A34-81AB-432B-8DAE-1953F412C126}" type="datetimeFigureOut">
               <a:rPr lang="en-US" smtClean="0"/>
               <a:pPr/>
-              <a:t>9/2/2017</a:t>
+              <a:t>9/3/2017</a:t>
             </a:fld>
             <a:endParaRPr lang="en-US" dirty="0"/>
           </a:p>
@@ -4786,7 +4786,7 @@
             <a:fld id="{48A87A34-81AB-432B-8DAE-1953F412C126}" type="datetimeFigureOut">
               <a:rPr lang="en-US" smtClean="0"/>
               <a:pPr/>
-              <a:t>9/2/2017</a:t>
+              <a:t>9/3/2017</a:t>
             </a:fld>
             <a:endParaRPr lang="en-US" dirty="0"/>
           </a:p>
@@ -4913,7 +4913,7 @@
             <a:fld id="{48A87A34-81AB-432B-8DAE-1953F412C126}" type="datetimeFigureOut">
               <a:rPr lang="en-US" smtClean="0"/>
               <a:pPr/>
-              <a:t>9/2/2017</a:t>
+              <a:t>9/3/2017</a:t>
             </a:fld>
             <a:endParaRPr lang="en-US" dirty="0"/>
           </a:p>
@@ -5194,7 +5194,7 @@
             <a:fld id="{48A87A34-81AB-432B-8DAE-1953F412C126}" type="datetimeFigureOut">
               <a:rPr lang="en-US" smtClean="0"/>
               <a:pPr/>
-              <a:t>9/2/2017</a:t>
+              <a:t>9/3/2017</a:t>
             </a:fld>
             <a:endParaRPr lang="en-US" dirty="0"/>
           </a:p>
@@ -5511,7 +5511,7 @@
             <a:fld id="{48A87A34-81AB-432B-8DAE-1953F412C126}" type="datetimeFigureOut">
               <a:rPr lang="en-US" smtClean="0"/>
               <a:pPr/>
-              <a:t>9/2/2017</a:t>
+              <a:t>9/3/2017</a:t>
             </a:fld>
             <a:endParaRPr lang="en-US" dirty="0"/>
           </a:p>
@@ -5766,7 +5766,7 @@
             <a:fld id="{48A87A34-81AB-432B-8DAE-1953F412C126}" type="datetimeFigureOut">
               <a:rPr lang="en-US" smtClean="0"/>
               <a:pPr/>
-              <a:t>9/2/2017</a:t>
+              <a:t>9/3/2017</a:t>
             </a:fld>
             <a:endParaRPr lang="en-US" dirty="0"/>
           </a:p>
@@ -6315,8 +6315,8 @@
           <a:lstStyle/>
           <a:p>
             <a:r>
-              <a:rPr lang="en-US" dirty="0" smtClean="0"/>
-              <a:t>Average Investment by funding Type</a:t>
+              <a:rPr lang="en-US" dirty="0"/>
+              <a:t>funding Type Average Investment </a:t>
             </a:r>
             <a:endParaRPr lang="en-US" dirty="0"/>
           </a:p>
@@ -6324,7 +6324,7 @@
       </p:sp>
       <p:pic>
         <p:nvPicPr>
-          <p:cNvPr id="6" name="Content Placeholder 5"/>
+          <p:cNvPr id="4" name="Content Placeholder 3"/>
           <p:cNvPicPr>
             <a:picLocks noGrp="1" noChangeAspect="1"/>
           </p:cNvPicPr>
@@ -6421,15 +6421,46 @@
             <p:ph sz="quarter" idx="13"/>
           </p:nvPr>
         </p:nvSpPr>
-        <p:spPr/>
-        <p:txBody>
-          <a:bodyPr/>
-          <a:lstStyle/>
+        <p:spPr>
+          <a:xfrm>
+            <a:off x="913774" y="2081048"/>
+            <a:ext cx="10363826" cy="3710151"/>
+          </a:xfrm>
+        </p:spPr>
+        <p:txBody>
+          <a:bodyPr>
+            <a:normAutofit fontScale="92500" lnSpcReduction="10000"/>
+          </a:bodyPr>
+          <a:lstStyle/>
+          <a:p>
+            <a:r>
+              <a:rPr lang="en-US" dirty="0" smtClean="0"/>
+              <a:t>Group Dynamics - </a:t>
+            </a:r>
+            <a:r>
+              <a:rPr lang="en-US" dirty="0"/>
+              <a:t>Bruce Tuckman said that </a:t>
+            </a:r>
+            <a:r>
+              <a:rPr lang="en-US" dirty="0" smtClean="0"/>
+              <a:t>“teams </a:t>
+            </a:r>
+            <a:r>
+              <a:rPr lang="en-US" dirty="0"/>
+              <a:t>go through 5 stages of development: forming, storming, norming, performing and </a:t>
+            </a:r>
+            <a:r>
+              <a:rPr lang="en-US" dirty="0" smtClean="0"/>
+              <a:t>adjourning”.</a:t>
+            </a:r>
+            <a:endParaRPr lang="en-US" dirty="0" smtClean="0"/>
+          </a:p>
           <a:p>
             <a:r>
               <a:rPr lang="en-US" dirty="0" smtClean="0"/>
               <a:t>Communication</a:t>
             </a:r>
+            <a:endParaRPr lang="en-US" dirty="0" smtClean="0"/>
           </a:p>
           <a:p>
             <a:r>
@@ -6447,26 +6478,43 @@
             <a:pPr lvl="1"/>
             <a:r>
               <a:rPr lang="en-US" dirty="0" smtClean="0"/>
-              <a:t>Questions to ask and explore…</a:t>
+              <a:t>Questions to ask and </a:t>
+            </a:r>
+            <a:r>
+              <a:rPr lang="en-US" dirty="0" smtClean="0"/>
+              <a:t>explore</a:t>
             </a:r>
           </a:p>
           <a:p>
             <a:pPr lvl="1"/>
             <a:r>
               <a:rPr lang="en-US" dirty="0" smtClean="0"/>
-              <a:t>What charts with what data…</a:t>
-            </a:r>
-          </a:p>
-          <a:p>
+              <a:t>What </a:t>
+            </a:r>
             <a:r>
               <a:rPr lang="en-US" dirty="0" smtClean="0"/>
-              <a:t>Distributing workload</a:t>
-            </a:r>
-          </a:p>
-          <a:p>
+              <a:t>charts with what </a:t>
+            </a:r>
             <a:r>
               <a:rPr lang="en-US" dirty="0" smtClean="0"/>
-              <a:t>Storing and Sharing files</a:t>
+              <a:t>data</a:t>
+            </a:r>
+          </a:p>
+          <a:p>
+            <a:r>
+              <a:rPr lang="en-US" dirty="0" smtClean="0"/>
+              <a:t>Distributing</a:t>
+            </a:r>
+            <a:endParaRPr lang="en-US" dirty="0"/>
+          </a:p>
+          <a:p>
+            <a:r>
+              <a:rPr lang="en-US" dirty="0" smtClean="0"/>
+              <a:t>Storing </a:t>
+            </a:r>
+            <a:r>
+              <a:rPr lang="en-US" dirty="0" smtClean="0"/>
+              <a:t>and Sharing files</a:t>
             </a:r>
           </a:p>
           <a:p>

</xml_diff>

<commit_message>
Save changes to nbk 09/11 10:48pm
</commit_message>
<xml_diff>
--- a/PowerPoint/Data visualization & Analytics_chrisg.pptx
+++ b/PowerPoint/Data visualization & Analytics_chrisg.pptx
@@ -4,16 +4,19 @@
   <p:sldMasterIdLst>
     <p:sldMasterId id="2147483669" r:id="rId1"/>
   </p:sldMasterIdLst>
+  <p:notesMasterIdLst>
+    <p:notesMasterId r:id="rId15"/>
+  </p:notesMasterIdLst>
   <p:sldIdLst>
     <p:sldId id="256" r:id="rId2"/>
     <p:sldId id="267" r:id="rId3"/>
-    <p:sldId id="257" r:id="rId4"/>
-    <p:sldId id="260" r:id="rId5"/>
-    <p:sldId id="262" r:id="rId6"/>
-    <p:sldId id="265" r:id="rId7"/>
-    <p:sldId id="266" r:id="rId8"/>
-    <p:sldId id="261" r:id="rId9"/>
-    <p:sldId id="264" r:id="rId10"/>
+    <p:sldId id="260" r:id="rId4"/>
+    <p:sldId id="262" r:id="rId5"/>
+    <p:sldId id="265" r:id="rId6"/>
+    <p:sldId id="266" r:id="rId7"/>
+    <p:sldId id="269" r:id="rId8"/>
+    <p:sldId id="264" r:id="rId9"/>
+    <p:sldId id="261" r:id="rId10"/>
     <p:sldId id="268" r:id="rId11"/>
     <p:sldId id="263" r:id="rId12"/>
     <p:sldId id="258" r:id="rId13"/>
@@ -135,6 +138,1368 @@
 </p:presentation>
 </file>
 
+<file path=ppt/notesMasters/notesMaster1.xml><?xml version="1.0" encoding="utf-8"?>
+<p:notesMaster xmlns:a="http://schemas.openxmlformats.org/drawingml/2006/main" xmlns:r="http://schemas.openxmlformats.org/officeDocument/2006/relationships" xmlns:p="http://schemas.openxmlformats.org/presentationml/2006/main">
+  <p:cSld>
+    <p:bg>
+      <p:bgRef idx="1001">
+        <a:schemeClr val="bg1"/>
+      </p:bgRef>
+    </p:bg>
+    <p:spTree>
+      <p:nvGrpSpPr>
+        <p:cNvPr id="1" name=""/>
+        <p:cNvGrpSpPr/>
+        <p:nvPr/>
+      </p:nvGrpSpPr>
+      <p:grpSpPr>
+        <a:xfrm>
+          <a:off x="0" y="0"/>
+          <a:ext cx="0" cy="0"/>
+          <a:chOff x="0" y="0"/>
+          <a:chExt cx="0" cy="0"/>
+        </a:xfrm>
+      </p:grpSpPr>
+      <p:sp>
+        <p:nvSpPr>
+          <p:cNvPr id="2" name="Header Placeholder 1"/>
+          <p:cNvSpPr>
+            <a:spLocks noGrp="1"/>
+          </p:cNvSpPr>
+          <p:nvPr>
+            <p:ph type="hdr" sz="quarter"/>
+          </p:nvPr>
+        </p:nvSpPr>
+        <p:spPr>
+          <a:xfrm>
+            <a:off x="0" y="0"/>
+            <a:ext cx="2971800" cy="458788"/>
+          </a:xfrm>
+          <a:prstGeom prst="rect">
+            <a:avLst/>
+          </a:prstGeom>
+        </p:spPr>
+        <p:txBody>
+          <a:bodyPr vert="horz" lIns="91440" tIns="45720" rIns="91440" bIns="45720" rtlCol="0"/>
+          <a:lstStyle>
+            <a:lvl1pPr algn="l">
+              <a:defRPr sz="1200"/>
+            </a:lvl1pPr>
+          </a:lstStyle>
+          <a:p>
+            <a:endParaRPr lang="en-US"/>
+          </a:p>
+        </p:txBody>
+      </p:sp>
+      <p:sp>
+        <p:nvSpPr>
+          <p:cNvPr id="3" name="Date Placeholder 2"/>
+          <p:cNvSpPr>
+            <a:spLocks noGrp="1"/>
+          </p:cNvSpPr>
+          <p:nvPr>
+            <p:ph type="dt" idx="1"/>
+          </p:nvPr>
+        </p:nvSpPr>
+        <p:spPr>
+          <a:xfrm>
+            <a:off x="3884613" y="0"/>
+            <a:ext cx="2971800" cy="458788"/>
+          </a:xfrm>
+          <a:prstGeom prst="rect">
+            <a:avLst/>
+          </a:prstGeom>
+        </p:spPr>
+        <p:txBody>
+          <a:bodyPr vert="horz" lIns="91440" tIns="45720" rIns="91440" bIns="45720" rtlCol="0"/>
+          <a:lstStyle>
+            <a:lvl1pPr algn="r">
+              <a:defRPr sz="1200"/>
+            </a:lvl1pPr>
+          </a:lstStyle>
+          <a:p>
+            <a:fld id="{90700FD8-EDD7-440D-B818-1D0CF60593B1}" type="datetimeFigureOut">
+              <a:rPr lang="en-US" smtClean="0"/>
+              <a:t>9/11/2017</a:t>
+            </a:fld>
+            <a:endParaRPr lang="en-US"/>
+          </a:p>
+        </p:txBody>
+      </p:sp>
+      <p:sp>
+        <p:nvSpPr>
+          <p:cNvPr id="4" name="Slide Image Placeholder 3"/>
+          <p:cNvSpPr>
+            <a:spLocks noGrp="1" noRot="1" noChangeAspect="1"/>
+          </p:cNvSpPr>
+          <p:nvPr>
+            <p:ph type="sldImg" idx="2"/>
+          </p:nvPr>
+        </p:nvSpPr>
+        <p:spPr>
+          <a:xfrm>
+            <a:off x="685800" y="1143000"/>
+            <a:ext cx="5486400" cy="3086100"/>
+          </a:xfrm>
+          <a:prstGeom prst="rect">
+            <a:avLst/>
+          </a:prstGeom>
+          <a:noFill/>
+          <a:ln w="12700">
+            <a:solidFill>
+              <a:prstClr val="black"/>
+            </a:solidFill>
+          </a:ln>
+        </p:spPr>
+        <p:txBody>
+          <a:bodyPr vert="horz" lIns="91440" tIns="45720" rIns="91440" bIns="45720" rtlCol="0" anchor="ctr"/>
+          <a:lstStyle/>
+          <a:p>
+            <a:endParaRPr lang="en-US"/>
+          </a:p>
+        </p:txBody>
+      </p:sp>
+      <p:sp>
+        <p:nvSpPr>
+          <p:cNvPr id="5" name="Notes Placeholder 4"/>
+          <p:cNvSpPr>
+            <a:spLocks noGrp="1"/>
+          </p:cNvSpPr>
+          <p:nvPr>
+            <p:ph type="body" sz="quarter" idx="3"/>
+          </p:nvPr>
+        </p:nvSpPr>
+        <p:spPr>
+          <a:xfrm>
+            <a:off x="685800" y="4400550"/>
+            <a:ext cx="5486400" cy="3600450"/>
+          </a:xfrm>
+          <a:prstGeom prst="rect">
+            <a:avLst/>
+          </a:prstGeom>
+        </p:spPr>
+        <p:txBody>
+          <a:bodyPr vert="horz" lIns="91440" tIns="45720" rIns="91440" bIns="45720" rtlCol="0"/>
+          <a:lstStyle/>
+          <a:p>
+            <a:pPr lvl="0"/>
+            <a:r>
+              <a:rPr lang="en-US" smtClean="0"/>
+              <a:t>Click to edit Master text styles</a:t>
+            </a:r>
+          </a:p>
+          <a:p>
+            <a:pPr lvl="1"/>
+            <a:r>
+              <a:rPr lang="en-US" smtClean="0"/>
+              <a:t>Second level</a:t>
+            </a:r>
+          </a:p>
+          <a:p>
+            <a:pPr lvl="2"/>
+            <a:r>
+              <a:rPr lang="en-US" smtClean="0"/>
+              <a:t>Third level</a:t>
+            </a:r>
+          </a:p>
+          <a:p>
+            <a:pPr lvl="3"/>
+            <a:r>
+              <a:rPr lang="en-US" smtClean="0"/>
+              <a:t>Fourth level</a:t>
+            </a:r>
+          </a:p>
+          <a:p>
+            <a:pPr lvl="4"/>
+            <a:r>
+              <a:rPr lang="en-US" smtClean="0"/>
+              <a:t>Fifth level</a:t>
+            </a:r>
+            <a:endParaRPr lang="en-US"/>
+          </a:p>
+        </p:txBody>
+      </p:sp>
+      <p:sp>
+        <p:nvSpPr>
+          <p:cNvPr id="6" name="Footer Placeholder 5"/>
+          <p:cNvSpPr>
+            <a:spLocks noGrp="1"/>
+          </p:cNvSpPr>
+          <p:nvPr>
+            <p:ph type="ftr" sz="quarter" idx="4"/>
+          </p:nvPr>
+        </p:nvSpPr>
+        <p:spPr>
+          <a:xfrm>
+            <a:off x="0" y="8685213"/>
+            <a:ext cx="2971800" cy="458787"/>
+          </a:xfrm>
+          <a:prstGeom prst="rect">
+            <a:avLst/>
+          </a:prstGeom>
+        </p:spPr>
+        <p:txBody>
+          <a:bodyPr vert="horz" lIns="91440" tIns="45720" rIns="91440" bIns="45720" rtlCol="0" anchor="b"/>
+          <a:lstStyle>
+            <a:lvl1pPr algn="l">
+              <a:defRPr sz="1200"/>
+            </a:lvl1pPr>
+          </a:lstStyle>
+          <a:p>
+            <a:endParaRPr lang="en-US"/>
+          </a:p>
+        </p:txBody>
+      </p:sp>
+      <p:sp>
+        <p:nvSpPr>
+          <p:cNvPr id="7" name="Slide Number Placeholder 6"/>
+          <p:cNvSpPr>
+            <a:spLocks noGrp="1"/>
+          </p:cNvSpPr>
+          <p:nvPr>
+            <p:ph type="sldNum" sz="quarter" idx="5"/>
+          </p:nvPr>
+        </p:nvSpPr>
+        <p:spPr>
+          <a:xfrm>
+            <a:off x="3884613" y="8685213"/>
+            <a:ext cx="2971800" cy="458787"/>
+          </a:xfrm>
+          <a:prstGeom prst="rect">
+            <a:avLst/>
+          </a:prstGeom>
+        </p:spPr>
+        <p:txBody>
+          <a:bodyPr vert="horz" lIns="91440" tIns="45720" rIns="91440" bIns="45720" rtlCol="0" anchor="b"/>
+          <a:lstStyle>
+            <a:lvl1pPr algn="r">
+              <a:defRPr sz="1200"/>
+            </a:lvl1pPr>
+          </a:lstStyle>
+          <a:p>
+            <a:fld id="{31B36890-31D9-41D1-8CA9-93A001E873BD}" type="slidenum">
+              <a:rPr lang="en-US" smtClean="0"/>
+              <a:t>‹#›</a:t>
+            </a:fld>
+            <a:endParaRPr lang="en-US"/>
+          </a:p>
+        </p:txBody>
+      </p:sp>
+    </p:spTree>
+    <p:extLst>
+      <p:ext uri="{BB962C8B-B14F-4D97-AF65-F5344CB8AC3E}">
+        <p14:creationId xmlns:p14="http://schemas.microsoft.com/office/powerpoint/2010/main" val="874366632"/>
+      </p:ext>
+    </p:extLst>
+  </p:cSld>
+  <p:clrMap bg1="lt1" tx1="dk1" bg2="lt2" tx2="dk2" accent1="accent1" accent2="accent2" accent3="accent3" accent4="accent4" accent5="accent5" accent6="accent6" hlink="hlink" folHlink="folHlink"/>
+  <p:notesStyle>
+    <a:lvl1pPr marL="0" algn="l" defTabSz="914400" rtl="0" eaLnBrk="1" latinLnBrk="0" hangingPunct="1">
+      <a:defRPr sz="1200" kern="1200">
+        <a:solidFill>
+          <a:schemeClr val="tx1"/>
+        </a:solidFill>
+        <a:latin typeface="+mn-lt"/>
+        <a:ea typeface="+mn-ea"/>
+        <a:cs typeface="+mn-cs"/>
+      </a:defRPr>
+    </a:lvl1pPr>
+    <a:lvl2pPr marL="457200" algn="l" defTabSz="914400" rtl="0" eaLnBrk="1" latinLnBrk="0" hangingPunct="1">
+      <a:defRPr sz="1200" kern="1200">
+        <a:solidFill>
+          <a:schemeClr val="tx1"/>
+        </a:solidFill>
+        <a:latin typeface="+mn-lt"/>
+        <a:ea typeface="+mn-ea"/>
+        <a:cs typeface="+mn-cs"/>
+      </a:defRPr>
+    </a:lvl2pPr>
+    <a:lvl3pPr marL="914400" algn="l" defTabSz="914400" rtl="0" eaLnBrk="1" latinLnBrk="0" hangingPunct="1">
+      <a:defRPr sz="1200" kern="1200">
+        <a:solidFill>
+          <a:schemeClr val="tx1"/>
+        </a:solidFill>
+        <a:latin typeface="+mn-lt"/>
+        <a:ea typeface="+mn-ea"/>
+        <a:cs typeface="+mn-cs"/>
+      </a:defRPr>
+    </a:lvl3pPr>
+    <a:lvl4pPr marL="1371600" algn="l" defTabSz="914400" rtl="0" eaLnBrk="1" latinLnBrk="0" hangingPunct="1">
+      <a:defRPr sz="1200" kern="1200">
+        <a:solidFill>
+          <a:schemeClr val="tx1"/>
+        </a:solidFill>
+        <a:latin typeface="+mn-lt"/>
+        <a:ea typeface="+mn-ea"/>
+        <a:cs typeface="+mn-cs"/>
+      </a:defRPr>
+    </a:lvl4pPr>
+    <a:lvl5pPr marL="1828800" algn="l" defTabSz="914400" rtl="0" eaLnBrk="1" latinLnBrk="0" hangingPunct="1">
+      <a:defRPr sz="1200" kern="1200">
+        <a:solidFill>
+          <a:schemeClr val="tx1"/>
+        </a:solidFill>
+        <a:latin typeface="+mn-lt"/>
+        <a:ea typeface="+mn-ea"/>
+        <a:cs typeface="+mn-cs"/>
+      </a:defRPr>
+    </a:lvl5pPr>
+    <a:lvl6pPr marL="2286000" algn="l" defTabSz="914400" rtl="0" eaLnBrk="1" latinLnBrk="0" hangingPunct="1">
+      <a:defRPr sz="1200" kern="1200">
+        <a:solidFill>
+          <a:schemeClr val="tx1"/>
+        </a:solidFill>
+        <a:latin typeface="+mn-lt"/>
+        <a:ea typeface="+mn-ea"/>
+        <a:cs typeface="+mn-cs"/>
+      </a:defRPr>
+    </a:lvl6pPr>
+    <a:lvl7pPr marL="2743200" algn="l" defTabSz="914400" rtl="0" eaLnBrk="1" latinLnBrk="0" hangingPunct="1">
+      <a:defRPr sz="1200" kern="1200">
+        <a:solidFill>
+          <a:schemeClr val="tx1"/>
+        </a:solidFill>
+        <a:latin typeface="+mn-lt"/>
+        <a:ea typeface="+mn-ea"/>
+        <a:cs typeface="+mn-cs"/>
+      </a:defRPr>
+    </a:lvl7pPr>
+    <a:lvl8pPr marL="3200400" algn="l" defTabSz="914400" rtl="0" eaLnBrk="1" latinLnBrk="0" hangingPunct="1">
+      <a:defRPr sz="1200" kern="1200">
+        <a:solidFill>
+          <a:schemeClr val="tx1"/>
+        </a:solidFill>
+        <a:latin typeface="+mn-lt"/>
+        <a:ea typeface="+mn-ea"/>
+        <a:cs typeface="+mn-cs"/>
+      </a:defRPr>
+    </a:lvl8pPr>
+    <a:lvl9pPr marL="3657600" algn="l" defTabSz="914400" rtl="0" eaLnBrk="1" latinLnBrk="0" hangingPunct="1">
+      <a:defRPr sz="1200" kern="1200">
+        <a:solidFill>
+          <a:schemeClr val="tx1"/>
+        </a:solidFill>
+        <a:latin typeface="+mn-lt"/>
+        <a:ea typeface="+mn-ea"/>
+        <a:cs typeface="+mn-cs"/>
+      </a:defRPr>
+    </a:lvl9pPr>
+  </p:notesStyle>
+</p:notesMaster>
+</file>
+
+<file path=ppt/notesSlides/notesSlide1.xml><?xml version="1.0" encoding="utf-8"?>
+<p:notes xmlns:a="http://schemas.openxmlformats.org/drawingml/2006/main" xmlns:r="http://schemas.openxmlformats.org/officeDocument/2006/relationships" xmlns:p="http://schemas.openxmlformats.org/presentationml/2006/main">
+  <p:cSld>
+    <p:spTree>
+      <p:nvGrpSpPr>
+        <p:cNvPr id="1" name=""/>
+        <p:cNvGrpSpPr/>
+        <p:nvPr/>
+      </p:nvGrpSpPr>
+      <p:grpSpPr>
+        <a:xfrm>
+          <a:off x="0" y="0"/>
+          <a:ext cx="0" cy="0"/>
+          <a:chOff x="0" y="0"/>
+          <a:chExt cx="0" cy="0"/>
+        </a:xfrm>
+      </p:grpSpPr>
+      <p:sp>
+        <p:nvSpPr>
+          <p:cNvPr id="2" name="Slide Image Placeholder 1"/>
+          <p:cNvSpPr>
+            <a:spLocks noGrp="1" noRot="1" noChangeAspect="1"/>
+          </p:cNvSpPr>
+          <p:nvPr>
+            <p:ph type="sldImg"/>
+          </p:nvPr>
+        </p:nvSpPr>
+        <p:spPr/>
+      </p:sp>
+      <p:sp>
+        <p:nvSpPr>
+          <p:cNvPr id="3" name="Notes Placeholder 2"/>
+          <p:cNvSpPr>
+            <a:spLocks noGrp="1"/>
+          </p:cNvSpPr>
+          <p:nvPr>
+            <p:ph type="body" idx="1"/>
+          </p:nvPr>
+        </p:nvSpPr>
+        <p:spPr/>
+        <p:txBody>
+          <a:bodyPr/>
+          <a:lstStyle/>
+          <a:p>
+            <a:endParaRPr lang="en-US" dirty="0"/>
+          </a:p>
+        </p:txBody>
+      </p:sp>
+      <p:sp>
+        <p:nvSpPr>
+          <p:cNvPr id="4" name="Slide Number Placeholder 3"/>
+          <p:cNvSpPr>
+            <a:spLocks noGrp="1"/>
+          </p:cNvSpPr>
+          <p:nvPr>
+            <p:ph type="sldNum" sz="quarter" idx="10"/>
+          </p:nvPr>
+        </p:nvSpPr>
+        <p:spPr/>
+        <p:txBody>
+          <a:bodyPr/>
+          <a:lstStyle/>
+          <a:p>
+            <a:fld id="{31B36890-31D9-41D1-8CA9-93A001E873BD}" type="slidenum">
+              <a:rPr lang="en-US" smtClean="0"/>
+              <a:t>1</a:t>
+            </a:fld>
+            <a:endParaRPr lang="en-US"/>
+          </a:p>
+        </p:txBody>
+      </p:sp>
+    </p:spTree>
+    <p:extLst>
+      <p:ext uri="{BB962C8B-B14F-4D97-AF65-F5344CB8AC3E}">
+        <p14:creationId xmlns:p14="http://schemas.microsoft.com/office/powerpoint/2010/main" val="275312556"/>
+      </p:ext>
+    </p:extLst>
+  </p:cSld>
+  <p:clrMapOvr>
+    <a:masterClrMapping/>
+  </p:clrMapOvr>
+</p:notes>
+</file>
+
+<file path=ppt/notesSlides/notesSlide10.xml><?xml version="1.0" encoding="utf-8"?>
+<p:notes xmlns:a="http://schemas.openxmlformats.org/drawingml/2006/main" xmlns:r="http://schemas.openxmlformats.org/officeDocument/2006/relationships" xmlns:p="http://schemas.openxmlformats.org/presentationml/2006/main">
+  <p:cSld>
+    <p:spTree>
+      <p:nvGrpSpPr>
+        <p:cNvPr id="1" name=""/>
+        <p:cNvGrpSpPr/>
+        <p:nvPr/>
+      </p:nvGrpSpPr>
+      <p:grpSpPr>
+        <a:xfrm>
+          <a:off x="0" y="0"/>
+          <a:ext cx="0" cy="0"/>
+          <a:chOff x="0" y="0"/>
+          <a:chExt cx="0" cy="0"/>
+        </a:xfrm>
+      </p:grpSpPr>
+      <p:sp>
+        <p:nvSpPr>
+          <p:cNvPr id="2" name="Slide Image Placeholder 1"/>
+          <p:cNvSpPr>
+            <a:spLocks noGrp="1" noRot="1" noChangeAspect="1"/>
+          </p:cNvSpPr>
+          <p:nvPr>
+            <p:ph type="sldImg"/>
+          </p:nvPr>
+        </p:nvSpPr>
+        <p:spPr/>
+      </p:sp>
+      <p:sp>
+        <p:nvSpPr>
+          <p:cNvPr id="3" name="Notes Placeholder 2"/>
+          <p:cNvSpPr>
+            <a:spLocks noGrp="1"/>
+          </p:cNvSpPr>
+          <p:nvPr>
+            <p:ph type="body" idx="1"/>
+          </p:nvPr>
+        </p:nvSpPr>
+        <p:spPr/>
+        <p:txBody>
+          <a:bodyPr/>
+          <a:lstStyle/>
+          <a:p>
+            <a:r>
+              <a:rPr lang="en-US" dirty="0" smtClean="0"/>
+              <a:t>This</a:t>
+            </a:r>
+            <a:r>
+              <a:rPr lang="en-US" baseline="0" dirty="0" smtClean="0"/>
+              <a:t> slide may be a little hard to read, even though we made all the text bold and increase the size.  The numbers are in tens of millions, and go from Seed to Series D on the x-axis and from 0 to 50 million on the y-axis.  Again look at the Seed average which $600,000 and around 46 million for Series D.  So even though Series D had the smallest total funding, it has the largest average investment.  Why is this?  Are you able to draw conclusions yet?</a:t>
+            </a:r>
+            <a:endParaRPr lang="en-US" dirty="0"/>
+          </a:p>
+        </p:txBody>
+      </p:sp>
+      <p:sp>
+        <p:nvSpPr>
+          <p:cNvPr id="4" name="Slide Number Placeholder 3"/>
+          <p:cNvSpPr>
+            <a:spLocks noGrp="1"/>
+          </p:cNvSpPr>
+          <p:nvPr>
+            <p:ph type="sldNum" sz="quarter" idx="10"/>
+          </p:nvPr>
+        </p:nvSpPr>
+        <p:spPr/>
+        <p:txBody>
+          <a:bodyPr/>
+          <a:lstStyle/>
+          <a:p>
+            <a:fld id="{31B36890-31D9-41D1-8CA9-93A001E873BD}" type="slidenum">
+              <a:rPr lang="en-US" smtClean="0"/>
+              <a:t>10</a:t>
+            </a:fld>
+            <a:endParaRPr lang="en-US"/>
+          </a:p>
+        </p:txBody>
+      </p:sp>
+    </p:spTree>
+    <p:extLst>
+      <p:ext uri="{BB962C8B-B14F-4D97-AF65-F5344CB8AC3E}">
+        <p14:creationId xmlns:p14="http://schemas.microsoft.com/office/powerpoint/2010/main" val="1258652593"/>
+      </p:ext>
+    </p:extLst>
+  </p:cSld>
+  <p:clrMapOvr>
+    <a:masterClrMapping/>
+  </p:clrMapOvr>
+</p:notes>
+</file>
+
+<file path=ppt/notesSlides/notesSlide11.xml><?xml version="1.0" encoding="utf-8"?>
+<p:notes xmlns:a="http://schemas.openxmlformats.org/drawingml/2006/main" xmlns:r="http://schemas.openxmlformats.org/officeDocument/2006/relationships" xmlns:p="http://schemas.openxmlformats.org/presentationml/2006/main">
+  <p:cSld>
+    <p:spTree>
+      <p:nvGrpSpPr>
+        <p:cNvPr id="1" name=""/>
+        <p:cNvGrpSpPr/>
+        <p:nvPr/>
+      </p:nvGrpSpPr>
+      <p:grpSpPr>
+        <a:xfrm>
+          <a:off x="0" y="0"/>
+          <a:ext cx="0" cy="0"/>
+          <a:chOff x="0" y="0"/>
+          <a:chExt cx="0" cy="0"/>
+        </a:xfrm>
+      </p:grpSpPr>
+      <p:sp>
+        <p:nvSpPr>
+          <p:cNvPr id="2" name="Slide Image Placeholder 1"/>
+          <p:cNvSpPr>
+            <a:spLocks noGrp="1" noRot="1" noChangeAspect="1"/>
+          </p:cNvSpPr>
+          <p:nvPr>
+            <p:ph type="sldImg"/>
+          </p:nvPr>
+        </p:nvSpPr>
+        <p:spPr/>
+      </p:sp>
+      <p:sp>
+        <p:nvSpPr>
+          <p:cNvPr id="3" name="Notes Placeholder 2"/>
+          <p:cNvSpPr>
+            <a:spLocks noGrp="1"/>
+          </p:cNvSpPr>
+          <p:nvPr>
+            <p:ph type="body" idx="1"/>
+          </p:nvPr>
+        </p:nvSpPr>
+        <p:spPr/>
+        <p:txBody>
+          <a:bodyPr/>
+          <a:lstStyle/>
+          <a:p>
+            <a:r>
+              <a:rPr lang="en-US" dirty="0" smtClean="0"/>
+              <a:t>This project was a lesson in</a:t>
+            </a:r>
+            <a:r>
+              <a:rPr lang="en-US" baseline="0" dirty="0" smtClean="0"/>
+              <a:t> group dynamics, a study of project management, and an experiment in letting human be human.  What are the lessons learned?</a:t>
+            </a:r>
+            <a:endParaRPr lang="en-US" dirty="0"/>
+          </a:p>
+        </p:txBody>
+      </p:sp>
+      <p:sp>
+        <p:nvSpPr>
+          <p:cNvPr id="4" name="Slide Number Placeholder 3"/>
+          <p:cNvSpPr>
+            <a:spLocks noGrp="1"/>
+          </p:cNvSpPr>
+          <p:nvPr>
+            <p:ph type="sldNum" sz="quarter" idx="10"/>
+          </p:nvPr>
+        </p:nvSpPr>
+        <p:spPr/>
+        <p:txBody>
+          <a:bodyPr/>
+          <a:lstStyle/>
+          <a:p>
+            <a:fld id="{31B36890-31D9-41D1-8CA9-93A001E873BD}" type="slidenum">
+              <a:rPr lang="en-US" smtClean="0"/>
+              <a:t>11</a:t>
+            </a:fld>
+            <a:endParaRPr lang="en-US"/>
+          </a:p>
+        </p:txBody>
+      </p:sp>
+    </p:spTree>
+    <p:extLst>
+      <p:ext uri="{BB962C8B-B14F-4D97-AF65-F5344CB8AC3E}">
+        <p14:creationId xmlns:p14="http://schemas.microsoft.com/office/powerpoint/2010/main" val="507112386"/>
+      </p:ext>
+    </p:extLst>
+  </p:cSld>
+  <p:clrMapOvr>
+    <a:masterClrMapping/>
+  </p:clrMapOvr>
+</p:notes>
+</file>
+
+<file path=ppt/notesSlides/notesSlide2.xml><?xml version="1.0" encoding="utf-8"?>
+<p:notes xmlns:a="http://schemas.openxmlformats.org/drawingml/2006/main" xmlns:r="http://schemas.openxmlformats.org/officeDocument/2006/relationships" xmlns:p="http://schemas.openxmlformats.org/presentationml/2006/main">
+  <p:cSld>
+    <p:spTree>
+      <p:nvGrpSpPr>
+        <p:cNvPr id="1" name=""/>
+        <p:cNvGrpSpPr/>
+        <p:nvPr/>
+      </p:nvGrpSpPr>
+      <p:grpSpPr>
+        <a:xfrm>
+          <a:off x="0" y="0"/>
+          <a:ext cx="0" cy="0"/>
+          <a:chOff x="0" y="0"/>
+          <a:chExt cx="0" cy="0"/>
+        </a:xfrm>
+      </p:grpSpPr>
+      <p:sp>
+        <p:nvSpPr>
+          <p:cNvPr id="2" name="Slide Image Placeholder 1"/>
+          <p:cNvSpPr>
+            <a:spLocks noGrp="1" noRot="1" noChangeAspect="1"/>
+          </p:cNvSpPr>
+          <p:nvPr>
+            <p:ph type="sldImg"/>
+          </p:nvPr>
+        </p:nvSpPr>
+        <p:spPr/>
+      </p:sp>
+      <p:sp>
+        <p:nvSpPr>
+          <p:cNvPr id="3" name="Notes Placeholder 2"/>
+          <p:cNvSpPr>
+            <a:spLocks noGrp="1"/>
+          </p:cNvSpPr>
+          <p:nvPr>
+            <p:ph type="body" idx="1"/>
+          </p:nvPr>
+        </p:nvSpPr>
+        <p:spPr/>
+        <p:txBody>
+          <a:bodyPr/>
+          <a:lstStyle/>
+          <a:p>
+            <a:r>
+              <a:rPr lang="en-US" dirty="0" smtClean="0"/>
+              <a:t>At</a:t>
+            </a:r>
+            <a:r>
+              <a:rPr lang="en-US" baseline="0" dirty="0" smtClean="0"/>
+              <a:t> my last company, safety moments were an important to share important and sometimes personal learnings about safety or unsafe situations.</a:t>
+            </a:r>
+            <a:endParaRPr lang="en-US" dirty="0"/>
+          </a:p>
+        </p:txBody>
+      </p:sp>
+      <p:sp>
+        <p:nvSpPr>
+          <p:cNvPr id="4" name="Slide Number Placeholder 3"/>
+          <p:cNvSpPr>
+            <a:spLocks noGrp="1"/>
+          </p:cNvSpPr>
+          <p:nvPr>
+            <p:ph type="sldNum" sz="quarter" idx="10"/>
+          </p:nvPr>
+        </p:nvSpPr>
+        <p:spPr/>
+        <p:txBody>
+          <a:bodyPr/>
+          <a:lstStyle/>
+          <a:p>
+            <a:fld id="{31B36890-31D9-41D1-8CA9-93A001E873BD}" type="slidenum">
+              <a:rPr lang="en-US" smtClean="0"/>
+              <a:t>2</a:t>
+            </a:fld>
+            <a:endParaRPr lang="en-US"/>
+          </a:p>
+        </p:txBody>
+      </p:sp>
+    </p:spTree>
+    <p:extLst>
+      <p:ext uri="{BB962C8B-B14F-4D97-AF65-F5344CB8AC3E}">
+        <p14:creationId xmlns:p14="http://schemas.microsoft.com/office/powerpoint/2010/main" val="79582725"/>
+      </p:ext>
+    </p:extLst>
+  </p:cSld>
+  <p:clrMapOvr>
+    <a:masterClrMapping/>
+  </p:clrMapOvr>
+</p:notes>
+</file>
+
+<file path=ppt/notesSlides/notesSlide3.xml><?xml version="1.0" encoding="utf-8"?>
+<p:notes xmlns:a="http://schemas.openxmlformats.org/drawingml/2006/main" xmlns:r="http://schemas.openxmlformats.org/officeDocument/2006/relationships" xmlns:p="http://schemas.openxmlformats.org/presentationml/2006/main">
+  <p:cSld>
+    <p:spTree>
+      <p:nvGrpSpPr>
+        <p:cNvPr id="1" name=""/>
+        <p:cNvGrpSpPr/>
+        <p:nvPr/>
+      </p:nvGrpSpPr>
+      <p:grpSpPr>
+        <a:xfrm>
+          <a:off x="0" y="0"/>
+          <a:ext cx="0" cy="0"/>
+          <a:chOff x="0" y="0"/>
+          <a:chExt cx="0" cy="0"/>
+        </a:xfrm>
+      </p:grpSpPr>
+      <p:sp>
+        <p:nvSpPr>
+          <p:cNvPr id="2" name="Slide Image Placeholder 1"/>
+          <p:cNvSpPr>
+            <a:spLocks noGrp="1" noRot="1" noChangeAspect="1"/>
+          </p:cNvSpPr>
+          <p:nvPr>
+            <p:ph type="sldImg"/>
+          </p:nvPr>
+        </p:nvSpPr>
+        <p:spPr/>
+      </p:sp>
+      <p:sp>
+        <p:nvSpPr>
+          <p:cNvPr id="3" name="Notes Placeholder 2"/>
+          <p:cNvSpPr>
+            <a:spLocks noGrp="1"/>
+          </p:cNvSpPr>
+          <p:nvPr>
+            <p:ph type="body" idx="1"/>
+          </p:nvPr>
+        </p:nvSpPr>
+        <p:spPr/>
+        <p:txBody>
+          <a:bodyPr/>
+          <a:lstStyle/>
+          <a:p>
+            <a:r>
+              <a:rPr lang="en-US" dirty="0" smtClean="0"/>
+              <a:t>Our project had</a:t>
+            </a:r>
+            <a:r>
+              <a:rPr lang="en-US" baseline="0" dirty="0" smtClean="0"/>
+              <a:t> Startups as the focus and what we could tell about them and their success as they moved through the different funding phases.</a:t>
+            </a:r>
+            <a:endParaRPr lang="en-US" dirty="0"/>
+          </a:p>
+        </p:txBody>
+      </p:sp>
+      <p:sp>
+        <p:nvSpPr>
+          <p:cNvPr id="4" name="Slide Number Placeholder 3"/>
+          <p:cNvSpPr>
+            <a:spLocks noGrp="1"/>
+          </p:cNvSpPr>
+          <p:nvPr>
+            <p:ph type="sldNum" sz="quarter" idx="10"/>
+          </p:nvPr>
+        </p:nvSpPr>
+        <p:spPr/>
+        <p:txBody>
+          <a:bodyPr/>
+          <a:lstStyle/>
+          <a:p>
+            <a:fld id="{31B36890-31D9-41D1-8CA9-93A001E873BD}" type="slidenum">
+              <a:rPr lang="en-US" smtClean="0"/>
+              <a:t>3</a:t>
+            </a:fld>
+            <a:endParaRPr lang="en-US"/>
+          </a:p>
+        </p:txBody>
+      </p:sp>
+    </p:spTree>
+    <p:extLst>
+      <p:ext uri="{BB962C8B-B14F-4D97-AF65-F5344CB8AC3E}">
+        <p14:creationId xmlns:p14="http://schemas.microsoft.com/office/powerpoint/2010/main" val="4149598039"/>
+      </p:ext>
+    </p:extLst>
+  </p:cSld>
+  <p:clrMapOvr>
+    <a:masterClrMapping/>
+  </p:clrMapOvr>
+</p:notes>
+</file>
+
+<file path=ppt/notesSlides/notesSlide4.xml><?xml version="1.0" encoding="utf-8"?>
+<p:notes xmlns:a="http://schemas.openxmlformats.org/drawingml/2006/main" xmlns:r="http://schemas.openxmlformats.org/officeDocument/2006/relationships" xmlns:p="http://schemas.openxmlformats.org/presentationml/2006/main">
+  <p:cSld>
+    <p:spTree>
+      <p:nvGrpSpPr>
+        <p:cNvPr id="1" name=""/>
+        <p:cNvGrpSpPr/>
+        <p:nvPr/>
+      </p:nvGrpSpPr>
+      <p:grpSpPr>
+        <a:xfrm>
+          <a:off x="0" y="0"/>
+          <a:ext cx="0" cy="0"/>
+          <a:chOff x="0" y="0"/>
+          <a:chExt cx="0" cy="0"/>
+        </a:xfrm>
+      </p:grpSpPr>
+      <p:sp>
+        <p:nvSpPr>
+          <p:cNvPr id="2" name="Slide Image Placeholder 1"/>
+          <p:cNvSpPr>
+            <a:spLocks noGrp="1" noRot="1" noChangeAspect="1"/>
+          </p:cNvSpPr>
+          <p:nvPr>
+            <p:ph type="sldImg"/>
+          </p:nvPr>
+        </p:nvSpPr>
+        <p:spPr/>
+      </p:sp>
+      <p:sp>
+        <p:nvSpPr>
+          <p:cNvPr id="3" name="Notes Placeholder 2"/>
+          <p:cNvSpPr>
+            <a:spLocks noGrp="1"/>
+          </p:cNvSpPr>
+          <p:nvPr>
+            <p:ph type="body" idx="1"/>
+          </p:nvPr>
+        </p:nvSpPr>
+        <p:spPr/>
+        <p:txBody>
+          <a:bodyPr/>
+          <a:lstStyle/>
+          <a:p>
+            <a:r>
+              <a:rPr lang="en-US" dirty="0" smtClean="0"/>
+              <a:t>Having to purchase a</a:t>
+            </a:r>
+            <a:r>
+              <a:rPr lang="en-US" baseline="0" dirty="0" smtClean="0"/>
+              <a:t> license to get any meaningful data was an impediment to our data gathering, and due to a limited number of us having data access, there were fewer eyes and minds on the task and able to put effort into understanding the data.  Understanding and knowing the data is key to the correct interpretation, visualization, and presentation of a story, questions and answers.</a:t>
+            </a:r>
+            <a:endParaRPr lang="en-US" dirty="0"/>
+          </a:p>
+        </p:txBody>
+      </p:sp>
+      <p:sp>
+        <p:nvSpPr>
+          <p:cNvPr id="4" name="Slide Number Placeholder 3"/>
+          <p:cNvSpPr>
+            <a:spLocks noGrp="1"/>
+          </p:cNvSpPr>
+          <p:nvPr>
+            <p:ph type="sldNum" sz="quarter" idx="10"/>
+          </p:nvPr>
+        </p:nvSpPr>
+        <p:spPr/>
+        <p:txBody>
+          <a:bodyPr/>
+          <a:lstStyle/>
+          <a:p>
+            <a:fld id="{31B36890-31D9-41D1-8CA9-93A001E873BD}" type="slidenum">
+              <a:rPr lang="en-US" smtClean="0"/>
+              <a:t>4</a:t>
+            </a:fld>
+            <a:endParaRPr lang="en-US"/>
+          </a:p>
+        </p:txBody>
+      </p:sp>
+    </p:spTree>
+    <p:extLst>
+      <p:ext uri="{BB962C8B-B14F-4D97-AF65-F5344CB8AC3E}">
+        <p14:creationId xmlns:p14="http://schemas.microsoft.com/office/powerpoint/2010/main" val="1612492683"/>
+      </p:ext>
+    </p:extLst>
+  </p:cSld>
+  <p:clrMapOvr>
+    <a:masterClrMapping/>
+  </p:clrMapOvr>
+</p:notes>
+</file>
+
+<file path=ppt/notesSlides/notesSlide5.xml><?xml version="1.0" encoding="utf-8"?>
+<p:notes xmlns:a="http://schemas.openxmlformats.org/drawingml/2006/main" xmlns:r="http://schemas.openxmlformats.org/officeDocument/2006/relationships" xmlns:p="http://schemas.openxmlformats.org/presentationml/2006/main">
+  <p:cSld>
+    <p:spTree>
+      <p:nvGrpSpPr>
+        <p:cNvPr id="1" name=""/>
+        <p:cNvGrpSpPr/>
+        <p:nvPr/>
+      </p:nvGrpSpPr>
+      <p:grpSpPr>
+        <a:xfrm>
+          <a:off x="0" y="0"/>
+          <a:ext cx="0" cy="0"/>
+          <a:chOff x="0" y="0"/>
+          <a:chExt cx="0" cy="0"/>
+        </a:xfrm>
+      </p:grpSpPr>
+      <p:sp>
+        <p:nvSpPr>
+          <p:cNvPr id="2" name="Slide Image Placeholder 1"/>
+          <p:cNvSpPr>
+            <a:spLocks noGrp="1" noRot="1" noChangeAspect="1"/>
+          </p:cNvSpPr>
+          <p:nvPr>
+            <p:ph type="sldImg"/>
+          </p:nvPr>
+        </p:nvSpPr>
+        <p:spPr/>
+      </p:sp>
+      <p:sp>
+        <p:nvSpPr>
+          <p:cNvPr id="3" name="Notes Placeholder 2"/>
+          <p:cNvSpPr>
+            <a:spLocks noGrp="1"/>
+          </p:cNvSpPr>
+          <p:nvPr>
+            <p:ph type="body" idx="1"/>
+          </p:nvPr>
+        </p:nvSpPr>
+        <p:spPr/>
+        <p:txBody>
+          <a:bodyPr/>
+          <a:lstStyle/>
+          <a:p>
+            <a:r>
+              <a:rPr lang="en-US" dirty="0" smtClean="0"/>
+              <a:t>The API turned out the be a dead-end due to it being</a:t>
+            </a:r>
+            <a:r>
+              <a:rPr lang="en-US" baseline="0" dirty="0" smtClean="0"/>
+              <a:t> inaccessible even for a paid license.  We did gain insight in how the API was used and structured, but that didn’t help this project.</a:t>
+            </a:r>
+            <a:endParaRPr lang="en-US" dirty="0"/>
+          </a:p>
+        </p:txBody>
+      </p:sp>
+      <p:sp>
+        <p:nvSpPr>
+          <p:cNvPr id="4" name="Slide Number Placeholder 3"/>
+          <p:cNvSpPr>
+            <a:spLocks noGrp="1"/>
+          </p:cNvSpPr>
+          <p:nvPr>
+            <p:ph type="sldNum" sz="quarter" idx="10"/>
+          </p:nvPr>
+        </p:nvSpPr>
+        <p:spPr/>
+        <p:txBody>
+          <a:bodyPr/>
+          <a:lstStyle/>
+          <a:p>
+            <a:fld id="{31B36890-31D9-41D1-8CA9-93A001E873BD}" type="slidenum">
+              <a:rPr lang="en-US" smtClean="0"/>
+              <a:t>5</a:t>
+            </a:fld>
+            <a:endParaRPr lang="en-US"/>
+          </a:p>
+        </p:txBody>
+      </p:sp>
+    </p:spTree>
+    <p:extLst>
+      <p:ext uri="{BB962C8B-B14F-4D97-AF65-F5344CB8AC3E}">
+        <p14:creationId xmlns:p14="http://schemas.microsoft.com/office/powerpoint/2010/main" val="1581699908"/>
+      </p:ext>
+    </p:extLst>
+  </p:cSld>
+  <p:clrMapOvr>
+    <a:masterClrMapping/>
+  </p:clrMapOvr>
+</p:notes>
+</file>
+
+<file path=ppt/notesSlides/notesSlide6.xml><?xml version="1.0" encoding="utf-8"?>
+<p:notes xmlns:a="http://schemas.openxmlformats.org/drawingml/2006/main" xmlns:r="http://schemas.openxmlformats.org/officeDocument/2006/relationships" xmlns:p="http://schemas.openxmlformats.org/presentationml/2006/main">
+  <p:cSld>
+    <p:spTree>
+      <p:nvGrpSpPr>
+        <p:cNvPr id="1" name=""/>
+        <p:cNvGrpSpPr/>
+        <p:nvPr/>
+      </p:nvGrpSpPr>
+      <p:grpSpPr>
+        <a:xfrm>
+          <a:off x="0" y="0"/>
+          <a:ext cx="0" cy="0"/>
+          <a:chOff x="0" y="0"/>
+          <a:chExt cx="0" cy="0"/>
+        </a:xfrm>
+      </p:grpSpPr>
+      <p:sp>
+        <p:nvSpPr>
+          <p:cNvPr id="2" name="Slide Image Placeholder 1"/>
+          <p:cNvSpPr>
+            <a:spLocks noGrp="1" noRot="1" noChangeAspect="1"/>
+          </p:cNvSpPr>
+          <p:nvPr>
+            <p:ph type="sldImg"/>
+          </p:nvPr>
+        </p:nvSpPr>
+        <p:spPr/>
+      </p:sp>
+      <p:sp>
+        <p:nvSpPr>
+          <p:cNvPr id="3" name="Notes Placeholder 2"/>
+          <p:cNvSpPr>
+            <a:spLocks noGrp="1"/>
+          </p:cNvSpPr>
+          <p:nvPr>
+            <p:ph type="body" idx="1"/>
+          </p:nvPr>
+        </p:nvSpPr>
+        <p:spPr/>
+        <p:txBody>
+          <a:bodyPr/>
+          <a:lstStyle/>
+          <a:p>
+            <a:r>
+              <a:rPr lang="en-US" dirty="0" smtClean="0"/>
+              <a:t>Screen scraping was harder</a:t>
+            </a:r>
+            <a:r>
+              <a:rPr lang="en-US" baseline="0" dirty="0" smtClean="0"/>
+              <a:t> than anticipated because the original data had the wrong URL for screen scraping.  In addition, not understanding the data led to a </a:t>
+            </a:r>
+            <a:r>
+              <a:rPr lang="en-US" baseline="0" dirty="0" smtClean="0"/>
+              <a:t>time consuming process</a:t>
+            </a:r>
+            <a:r>
+              <a:rPr lang="en-US" baseline="0" dirty="0" smtClean="0"/>
+              <a:t> to retrieve URLs.  Now, that the data is cleansed and better understood, the URLs are available without having to jump through hoops to get them.</a:t>
+            </a:r>
+            <a:endParaRPr lang="en-US" dirty="0"/>
+          </a:p>
+        </p:txBody>
+      </p:sp>
+      <p:sp>
+        <p:nvSpPr>
+          <p:cNvPr id="4" name="Slide Number Placeholder 3"/>
+          <p:cNvSpPr>
+            <a:spLocks noGrp="1"/>
+          </p:cNvSpPr>
+          <p:nvPr>
+            <p:ph type="sldNum" sz="quarter" idx="10"/>
+          </p:nvPr>
+        </p:nvSpPr>
+        <p:spPr/>
+        <p:txBody>
+          <a:bodyPr/>
+          <a:lstStyle/>
+          <a:p>
+            <a:fld id="{31B36890-31D9-41D1-8CA9-93A001E873BD}" type="slidenum">
+              <a:rPr lang="en-US" smtClean="0"/>
+              <a:t>6</a:t>
+            </a:fld>
+            <a:endParaRPr lang="en-US"/>
+          </a:p>
+        </p:txBody>
+      </p:sp>
+    </p:spTree>
+    <p:extLst>
+      <p:ext uri="{BB962C8B-B14F-4D97-AF65-F5344CB8AC3E}">
+        <p14:creationId xmlns:p14="http://schemas.microsoft.com/office/powerpoint/2010/main" val="2424335820"/>
+      </p:ext>
+    </p:extLst>
+  </p:cSld>
+  <p:clrMapOvr>
+    <a:masterClrMapping/>
+  </p:clrMapOvr>
+</p:notes>
+</file>
+
+<file path=ppt/notesSlides/notesSlide7.xml><?xml version="1.0" encoding="utf-8"?>
+<p:notes xmlns:a="http://schemas.openxmlformats.org/drawingml/2006/main" xmlns:r="http://schemas.openxmlformats.org/officeDocument/2006/relationships" xmlns:p="http://schemas.openxmlformats.org/presentationml/2006/main">
+  <p:cSld>
+    <p:spTree>
+      <p:nvGrpSpPr>
+        <p:cNvPr id="1" name=""/>
+        <p:cNvGrpSpPr/>
+        <p:nvPr/>
+      </p:nvGrpSpPr>
+      <p:grpSpPr>
+        <a:xfrm>
+          <a:off x="0" y="0"/>
+          <a:ext cx="0" cy="0"/>
+          <a:chOff x="0" y="0"/>
+          <a:chExt cx="0" cy="0"/>
+        </a:xfrm>
+      </p:grpSpPr>
+      <p:sp>
+        <p:nvSpPr>
+          <p:cNvPr id="2" name="Slide Image Placeholder 1"/>
+          <p:cNvSpPr>
+            <a:spLocks noGrp="1" noRot="1" noChangeAspect="1"/>
+          </p:cNvSpPr>
+          <p:nvPr>
+            <p:ph type="sldImg"/>
+          </p:nvPr>
+        </p:nvSpPr>
+        <p:spPr/>
+      </p:sp>
+      <p:sp>
+        <p:nvSpPr>
+          <p:cNvPr id="3" name="Notes Placeholder 2"/>
+          <p:cNvSpPr>
+            <a:spLocks noGrp="1"/>
+          </p:cNvSpPr>
+          <p:nvPr>
+            <p:ph type="body" idx="1"/>
+          </p:nvPr>
+        </p:nvSpPr>
+        <p:spPr/>
+        <p:txBody>
+          <a:bodyPr/>
+          <a:lstStyle/>
+          <a:p>
+            <a:r>
+              <a:rPr lang="en-US" dirty="0" smtClean="0"/>
+              <a:t>Not all team members had access to extracting data because we had to purchase</a:t>
+            </a:r>
+            <a:r>
+              <a:rPr lang="en-US" baseline="0" dirty="0" smtClean="0"/>
+              <a:t> licenses to get any meaningful data.  Therefore, data cleansing became more important but also problematic because the people cleaning weren’t as close to the data since they didn’t retrieve the data.</a:t>
+            </a:r>
+            <a:endParaRPr lang="en-US" dirty="0"/>
+          </a:p>
+        </p:txBody>
+      </p:sp>
+      <p:sp>
+        <p:nvSpPr>
+          <p:cNvPr id="4" name="Slide Number Placeholder 3"/>
+          <p:cNvSpPr>
+            <a:spLocks noGrp="1"/>
+          </p:cNvSpPr>
+          <p:nvPr>
+            <p:ph type="sldNum" sz="quarter" idx="10"/>
+          </p:nvPr>
+        </p:nvSpPr>
+        <p:spPr/>
+        <p:txBody>
+          <a:bodyPr/>
+          <a:lstStyle/>
+          <a:p>
+            <a:fld id="{31B36890-31D9-41D1-8CA9-93A001E873BD}" type="slidenum">
+              <a:rPr lang="en-US" smtClean="0"/>
+              <a:t>7</a:t>
+            </a:fld>
+            <a:endParaRPr lang="en-US"/>
+          </a:p>
+        </p:txBody>
+      </p:sp>
+    </p:spTree>
+    <p:extLst>
+      <p:ext uri="{BB962C8B-B14F-4D97-AF65-F5344CB8AC3E}">
+        <p14:creationId xmlns:p14="http://schemas.microsoft.com/office/powerpoint/2010/main" val="40069163"/>
+      </p:ext>
+    </p:extLst>
+  </p:cSld>
+  <p:clrMapOvr>
+    <a:masterClrMapping/>
+  </p:clrMapOvr>
+</p:notes>
+</file>
+
+<file path=ppt/notesSlides/notesSlide8.xml><?xml version="1.0" encoding="utf-8"?>
+<p:notes xmlns:a="http://schemas.openxmlformats.org/drawingml/2006/main" xmlns:r="http://schemas.openxmlformats.org/officeDocument/2006/relationships" xmlns:p="http://schemas.openxmlformats.org/presentationml/2006/main">
+  <p:cSld>
+    <p:spTree>
+      <p:nvGrpSpPr>
+        <p:cNvPr id="1" name=""/>
+        <p:cNvGrpSpPr/>
+        <p:nvPr/>
+      </p:nvGrpSpPr>
+      <p:grpSpPr>
+        <a:xfrm>
+          <a:off x="0" y="0"/>
+          <a:ext cx="0" cy="0"/>
+          <a:chOff x="0" y="0"/>
+          <a:chExt cx="0" cy="0"/>
+        </a:xfrm>
+      </p:grpSpPr>
+      <p:sp>
+        <p:nvSpPr>
+          <p:cNvPr id="2" name="Slide Image Placeholder 1"/>
+          <p:cNvSpPr>
+            <a:spLocks noGrp="1" noRot="1" noChangeAspect="1"/>
+          </p:cNvSpPr>
+          <p:nvPr>
+            <p:ph type="sldImg"/>
+          </p:nvPr>
+        </p:nvSpPr>
+        <p:spPr/>
+      </p:sp>
+      <p:sp>
+        <p:nvSpPr>
+          <p:cNvPr id="3" name="Notes Placeholder 2"/>
+          <p:cNvSpPr>
+            <a:spLocks noGrp="1"/>
+          </p:cNvSpPr>
+          <p:nvPr>
+            <p:ph type="body" idx="1"/>
+          </p:nvPr>
+        </p:nvSpPr>
+        <p:spPr/>
+        <p:txBody>
+          <a:bodyPr/>
+          <a:lstStyle/>
+          <a:p>
+            <a:r>
+              <a:rPr lang="en-US" dirty="0" smtClean="0"/>
+              <a:t>This</a:t>
+            </a:r>
+            <a:r>
+              <a:rPr lang="en-US" baseline="0" dirty="0" smtClean="0"/>
+              <a:t> slide shows that the largest funding type is seed followed by Series A thru D.  Seed funding is the starting funding while companies move thru Series A to Series D based on their success at fund raising but also hopefully on their actual and potential eventual success as a company.  Coming slides will put this slide into better context.</a:t>
+            </a:r>
+            <a:endParaRPr lang="en-US" dirty="0"/>
+          </a:p>
+        </p:txBody>
+      </p:sp>
+      <p:sp>
+        <p:nvSpPr>
+          <p:cNvPr id="4" name="Slide Number Placeholder 3"/>
+          <p:cNvSpPr>
+            <a:spLocks noGrp="1"/>
+          </p:cNvSpPr>
+          <p:nvPr>
+            <p:ph type="sldNum" sz="quarter" idx="10"/>
+          </p:nvPr>
+        </p:nvSpPr>
+        <p:spPr/>
+        <p:txBody>
+          <a:bodyPr/>
+          <a:lstStyle/>
+          <a:p>
+            <a:fld id="{31B36890-31D9-41D1-8CA9-93A001E873BD}" type="slidenum">
+              <a:rPr lang="en-US" smtClean="0"/>
+              <a:t>8</a:t>
+            </a:fld>
+            <a:endParaRPr lang="en-US"/>
+          </a:p>
+        </p:txBody>
+      </p:sp>
+    </p:spTree>
+    <p:extLst>
+      <p:ext uri="{BB962C8B-B14F-4D97-AF65-F5344CB8AC3E}">
+        <p14:creationId xmlns:p14="http://schemas.microsoft.com/office/powerpoint/2010/main" val="1615266692"/>
+      </p:ext>
+    </p:extLst>
+  </p:cSld>
+  <p:clrMapOvr>
+    <a:masterClrMapping/>
+  </p:clrMapOvr>
+</p:notes>
+</file>
+
+<file path=ppt/notesSlides/notesSlide9.xml><?xml version="1.0" encoding="utf-8"?>
+<p:notes xmlns:a="http://schemas.openxmlformats.org/drawingml/2006/main" xmlns:r="http://schemas.openxmlformats.org/officeDocument/2006/relationships" xmlns:p="http://schemas.openxmlformats.org/presentationml/2006/main">
+  <p:cSld>
+    <p:spTree>
+      <p:nvGrpSpPr>
+        <p:cNvPr id="1" name=""/>
+        <p:cNvGrpSpPr/>
+        <p:nvPr/>
+      </p:nvGrpSpPr>
+      <p:grpSpPr>
+        <a:xfrm>
+          <a:off x="0" y="0"/>
+          <a:ext cx="0" cy="0"/>
+          <a:chOff x="0" y="0"/>
+          <a:chExt cx="0" cy="0"/>
+        </a:xfrm>
+      </p:grpSpPr>
+      <p:sp>
+        <p:nvSpPr>
+          <p:cNvPr id="2" name="Slide Image Placeholder 1"/>
+          <p:cNvSpPr>
+            <a:spLocks noGrp="1" noRot="1" noChangeAspect="1"/>
+          </p:cNvSpPr>
+          <p:nvPr>
+            <p:ph type="sldImg"/>
+          </p:nvPr>
+        </p:nvSpPr>
+        <p:spPr/>
+      </p:sp>
+      <p:sp>
+        <p:nvSpPr>
+          <p:cNvPr id="3" name="Notes Placeholder 2"/>
+          <p:cNvSpPr>
+            <a:spLocks noGrp="1"/>
+          </p:cNvSpPr>
+          <p:nvPr>
+            <p:ph type="body" idx="1"/>
+          </p:nvPr>
+        </p:nvSpPr>
+        <p:spPr/>
+        <p:txBody>
+          <a:bodyPr/>
+          <a:lstStyle/>
+          <a:p>
+            <a:r>
+              <a:rPr lang="en-US" dirty="0" smtClean="0"/>
+              <a:t>This slide shows the total funding by funding type.  As you can</a:t>
+            </a:r>
+            <a:r>
+              <a:rPr lang="en-US" baseline="0" dirty="0" smtClean="0"/>
+              <a:t> see, Seed funding total is only 10% while in the previous slide it was 58% of the funding types.  Also, notice the percentages after Seed, starting with Series A to Series D get progressively smaller in terms of total funding.  Some of the conclusions take a little time to absorb.</a:t>
+            </a:r>
+            <a:endParaRPr lang="en-US" dirty="0"/>
+          </a:p>
+        </p:txBody>
+      </p:sp>
+      <p:sp>
+        <p:nvSpPr>
+          <p:cNvPr id="4" name="Slide Number Placeholder 3"/>
+          <p:cNvSpPr>
+            <a:spLocks noGrp="1"/>
+          </p:cNvSpPr>
+          <p:nvPr>
+            <p:ph type="sldNum" sz="quarter" idx="10"/>
+          </p:nvPr>
+        </p:nvSpPr>
+        <p:spPr/>
+        <p:txBody>
+          <a:bodyPr/>
+          <a:lstStyle/>
+          <a:p>
+            <a:fld id="{31B36890-31D9-41D1-8CA9-93A001E873BD}" type="slidenum">
+              <a:rPr lang="en-US" smtClean="0"/>
+              <a:t>9</a:t>
+            </a:fld>
+            <a:endParaRPr lang="en-US"/>
+          </a:p>
+        </p:txBody>
+      </p:sp>
+    </p:spTree>
+    <p:extLst>
+      <p:ext uri="{BB962C8B-B14F-4D97-AF65-F5344CB8AC3E}">
+        <p14:creationId xmlns:p14="http://schemas.microsoft.com/office/powerpoint/2010/main" val="3190169614"/>
+      </p:ext>
+    </p:extLst>
+  </p:cSld>
+  <p:clrMapOvr>
+    <a:masterClrMapping/>
+  </p:clrMapOvr>
+</p:notes>
+</file>
+
 <file path=ppt/slideLayouts/slideLayout1.xml><?xml version="1.0" encoding="utf-8"?>
 <p:sldLayout xmlns:a="http://schemas.openxmlformats.org/drawingml/2006/main" xmlns:r="http://schemas.openxmlformats.org/officeDocument/2006/relationships" xmlns:p="http://schemas.openxmlformats.org/presentationml/2006/main" type="title" preserve="1">
   <p:cSld name="Title Slide">
@@ -307,7 +1672,7 @@
             <a:fld id="{48A87A34-81AB-432B-8DAE-1953F412C126}" type="datetimeFigureOut">
               <a:rPr lang="en-US" smtClean="0"/>
               <a:pPr/>
-              <a:t>9/3/2017</a:t>
+              <a:t>9/11/2017</a:t>
             </a:fld>
             <a:endParaRPr lang="en-US" dirty="0"/>
           </a:p>
@@ -624,7 +1989,7 @@
             <a:fld id="{48A87A34-81AB-432B-8DAE-1953F412C126}" type="datetimeFigureOut">
               <a:rPr lang="en-US" smtClean="0"/>
               <a:pPr/>
-              <a:t>9/3/2017</a:t>
+              <a:t>9/11/2017</a:t>
             </a:fld>
             <a:endParaRPr lang="en-US" dirty="0"/>
           </a:p>
@@ -848,7 +2213,7 @@
             <a:fld id="{48A87A34-81AB-432B-8DAE-1953F412C126}" type="datetimeFigureOut">
               <a:rPr lang="en-US" smtClean="0"/>
               <a:pPr/>
-              <a:t>9/3/2017</a:t>
+              <a:t>9/11/2017</a:t>
             </a:fld>
             <a:endParaRPr lang="en-US" dirty="0"/>
           </a:p>
@@ -1141,7 +2506,7 @@
             <a:fld id="{48A87A34-81AB-432B-8DAE-1953F412C126}" type="datetimeFigureOut">
               <a:rPr lang="en-US" smtClean="0"/>
               <a:pPr/>
-              <a:t>9/3/2017</a:t>
+              <a:t>9/11/2017</a:t>
             </a:fld>
             <a:endParaRPr lang="en-US" dirty="0"/>
           </a:p>
@@ -1597,7 +2962,7 @@
             <a:fld id="{48A87A34-81AB-432B-8DAE-1953F412C126}" type="datetimeFigureOut">
               <a:rPr lang="en-US" smtClean="0"/>
               <a:pPr/>
-              <a:t>9/3/2017</a:t>
+              <a:t>9/11/2017</a:t>
             </a:fld>
             <a:endParaRPr lang="en-US" dirty="0"/>
           </a:p>
@@ -2175,7 +3540,7 @@
             <a:fld id="{48A87A34-81AB-432B-8DAE-1953F412C126}" type="datetimeFigureOut">
               <a:rPr lang="en-US" smtClean="0"/>
               <a:pPr/>
-              <a:t>9/3/2017</a:t>
+              <a:t>9/11/2017</a:t>
             </a:fld>
             <a:endParaRPr lang="en-US" dirty="0"/>
           </a:p>
@@ -3038,7 +4403,7 @@
             <a:fld id="{48A87A34-81AB-432B-8DAE-1953F412C126}" type="datetimeFigureOut">
               <a:rPr lang="en-US" smtClean="0"/>
               <a:pPr/>
-              <a:t>9/3/2017</a:t>
+              <a:t>9/11/2017</a:t>
             </a:fld>
             <a:endParaRPr lang="en-US" dirty="0"/>
           </a:p>
@@ -3245,7 +4610,7 @@
             <a:fld id="{48A87A34-81AB-432B-8DAE-1953F412C126}" type="datetimeFigureOut">
               <a:rPr lang="en-US" smtClean="0"/>
               <a:pPr/>
-              <a:t>9/3/2017</a:t>
+              <a:t>9/11/2017</a:t>
             </a:fld>
             <a:endParaRPr lang="en-US" dirty="0"/>
           </a:p>
@@ -3461,7 +4826,7 @@
             <a:fld id="{48A87A34-81AB-432B-8DAE-1953F412C126}" type="datetimeFigureOut">
               <a:rPr lang="en-US" smtClean="0"/>
               <a:pPr/>
-              <a:t>9/3/2017</a:t>
+              <a:t>9/11/2017</a:t>
             </a:fld>
             <a:endParaRPr lang="en-US" dirty="0"/>
           </a:p>
@@ -3668,7 +5033,7 @@
             <a:fld id="{48A87A34-81AB-432B-8DAE-1953F412C126}" type="datetimeFigureOut">
               <a:rPr lang="en-US" smtClean="0"/>
               <a:pPr/>
-              <a:t>9/3/2017</a:t>
+              <a:t>9/11/2017</a:t>
             </a:fld>
             <a:endParaRPr lang="en-US" dirty="0"/>
           </a:p>
@@ -3950,7 +5315,7 @@
             <a:fld id="{48A87A34-81AB-432B-8DAE-1953F412C126}" type="datetimeFigureOut">
               <a:rPr lang="en-US" smtClean="0"/>
               <a:pPr/>
-              <a:t>9/3/2017</a:t>
+              <a:t>9/11/2017</a:t>
             </a:fld>
             <a:endParaRPr lang="en-US" dirty="0"/>
           </a:p>
@@ -4219,7 +5584,7 @@
             <a:fld id="{48A87A34-81AB-432B-8DAE-1953F412C126}" type="datetimeFigureOut">
               <a:rPr lang="en-US" smtClean="0"/>
               <a:pPr/>
-              <a:t>9/3/2017</a:t>
+              <a:t>9/11/2017</a:t>
             </a:fld>
             <a:endParaRPr lang="en-US" dirty="0"/>
           </a:p>
@@ -4636,7 +6001,7 @@
             <a:fld id="{48A87A34-81AB-432B-8DAE-1953F412C126}" type="datetimeFigureOut">
               <a:rPr lang="en-US" smtClean="0"/>
               <a:pPr/>
-              <a:t>9/3/2017</a:t>
+              <a:t>9/11/2017</a:t>
             </a:fld>
             <a:endParaRPr lang="en-US" dirty="0"/>
           </a:p>
@@ -4786,7 +6151,7 @@
             <a:fld id="{48A87A34-81AB-432B-8DAE-1953F412C126}" type="datetimeFigureOut">
               <a:rPr lang="en-US" smtClean="0"/>
               <a:pPr/>
-              <a:t>9/3/2017</a:t>
+              <a:t>9/11/2017</a:t>
             </a:fld>
             <a:endParaRPr lang="en-US" dirty="0"/>
           </a:p>
@@ -4913,7 +6278,7 @@
             <a:fld id="{48A87A34-81AB-432B-8DAE-1953F412C126}" type="datetimeFigureOut">
               <a:rPr lang="en-US" smtClean="0"/>
               <a:pPr/>
-              <a:t>9/3/2017</a:t>
+              <a:t>9/11/2017</a:t>
             </a:fld>
             <a:endParaRPr lang="en-US" dirty="0"/>
           </a:p>
@@ -5194,7 +6559,7 @@
             <a:fld id="{48A87A34-81AB-432B-8DAE-1953F412C126}" type="datetimeFigureOut">
               <a:rPr lang="en-US" smtClean="0"/>
               <a:pPr/>
-              <a:t>9/3/2017</a:t>
+              <a:t>9/11/2017</a:t>
             </a:fld>
             <a:endParaRPr lang="en-US" dirty="0"/>
           </a:p>
@@ -5511,7 +6876,7 @@
             <a:fld id="{48A87A34-81AB-432B-8DAE-1953F412C126}" type="datetimeFigureOut">
               <a:rPr lang="en-US" smtClean="0"/>
               <a:pPr/>
-              <a:t>9/3/2017</a:t>
+              <a:t>9/11/2017</a:t>
             </a:fld>
             <a:endParaRPr lang="en-US" dirty="0"/>
           </a:p>
@@ -5766,7 +7131,7 @@
             <a:fld id="{48A87A34-81AB-432B-8DAE-1953F412C126}" type="datetimeFigureOut">
               <a:rPr lang="en-US" smtClean="0"/>
               <a:pPr/>
-              <a:t>9/3/2017</a:t>
+              <a:t>9/11/2017</a:t>
             </a:fld>
             <a:endParaRPr lang="en-US" dirty="0"/>
           </a:p>
@@ -6256,7 +7621,11 @@
           <a:p>
             <a:r>
               <a:rPr lang="en-US" dirty="0" smtClean="0"/>
-              <a:t>Project -1-Crunch-Team</a:t>
+              <a:t>Project </a:t>
+            </a:r>
+            <a:r>
+              <a:rPr lang="en-US" dirty="0" smtClean="0"/>
+              <a:t>-1 Startups</a:t>
             </a:r>
             <a:endParaRPr lang="en-US" dirty="0"/>
           </a:p>
@@ -6318,13 +7687,12 @@
               <a:rPr lang="en-US" dirty="0"/>
               <a:t>funding Type Average Investment </a:t>
             </a:r>
-            <a:endParaRPr lang="en-US" dirty="0"/>
           </a:p>
         </p:txBody>
       </p:sp>
       <p:pic>
         <p:nvPicPr>
-          <p:cNvPr id="4" name="Content Placeholder 3"/>
+          <p:cNvPr id="5" name="Content Placeholder 4"/>
           <p:cNvPicPr>
             <a:picLocks noGrp="1" noChangeAspect="1"/>
           </p:cNvPicPr>
@@ -6333,7 +7701,7 @@
           </p:nvPr>
         </p:nvPicPr>
         <p:blipFill>
-          <a:blip r:embed="rId2">
+          <a:blip r:embed="rId3">
             <a:extLst>
               <a:ext uri="{28A0092B-C50C-407E-A947-70E740481C1C}">
                 <a14:useLocalDpi xmlns:a14="http://schemas.microsoft.com/office/drawing/2010/main" val="0"/>
@@ -6346,8 +7714,8 @@
         </p:blipFill>
         <p:spPr>
           <a:xfrm>
-            <a:off x="3605646" y="2366963"/>
-            <a:ext cx="4980708" cy="3424237"/>
+            <a:off x="3314700" y="2214695"/>
+            <a:ext cx="5271654" cy="3576506"/>
           </a:xfrm>
         </p:spPr>
       </p:pic>
@@ -6429,7 +7797,7 @@
         </p:spPr>
         <p:txBody>
           <a:bodyPr>
-            <a:normAutofit fontScale="92500" lnSpcReduction="10000"/>
+            <a:normAutofit fontScale="85000" lnSpcReduction="20000"/>
           </a:bodyPr>
           <a:lstStyle/>
           <a:p>
@@ -6453,69 +7821,87 @@
               <a:rPr lang="en-US" dirty="0" smtClean="0"/>
               <a:t>adjourning”.</a:t>
             </a:r>
+          </a:p>
+          <a:p>
+            <a:r>
+              <a:rPr lang="en-US" dirty="0" smtClean="0"/>
+              <a:t>Our group:</a:t>
+            </a:r>
+          </a:p>
+          <a:p>
+            <a:pPr lvl="1"/>
+            <a:r>
+              <a:rPr lang="en-US" dirty="0" smtClean="0"/>
+              <a:t>Minimal Planning and no checkpoints</a:t>
+            </a:r>
+          </a:p>
+          <a:p>
+            <a:pPr lvl="1"/>
+            <a:r>
+              <a:rPr lang="en-US" dirty="0" smtClean="0"/>
+              <a:t>brainstorming session for story, questions, and data</a:t>
+            </a:r>
             <a:endParaRPr lang="en-US" dirty="0" smtClean="0"/>
           </a:p>
           <a:p>
-            <a:r>
-              <a:rPr lang="en-US" dirty="0" smtClean="0"/>
-              <a:t>Communication</a:t>
+            <a:pPr lvl="2"/>
+            <a:r>
+              <a:rPr lang="en-US" dirty="0" smtClean="0"/>
+              <a:t>No development of </a:t>
+            </a:r>
+            <a:r>
+              <a:rPr lang="en-US" dirty="0" smtClean="0"/>
+              <a:t>ideas </a:t>
+            </a:r>
+            <a:r>
+              <a:rPr lang="en-US" dirty="0" smtClean="0"/>
+              <a:t>or documentation beyond the initial session</a:t>
             </a:r>
             <a:endParaRPr lang="en-US" dirty="0" smtClean="0"/>
           </a:p>
           <a:p>
-            <a:r>
-              <a:rPr lang="en-US" dirty="0" smtClean="0"/>
-              <a:t>Planning</a:t>
-            </a:r>
-          </a:p>
-          <a:p>
-            <a:r>
-              <a:rPr lang="en-US" dirty="0" smtClean="0"/>
-              <a:t>Brain Storming </a:t>
+            <a:pPr lvl="2"/>
+            <a:r>
+              <a:rPr lang="en-US" dirty="0" smtClean="0"/>
+              <a:t>No clear specifications or requirements for the charts and data </a:t>
             </a:r>
           </a:p>
           <a:p>
             <a:pPr lvl="1"/>
             <a:r>
               <a:rPr lang="en-US" dirty="0" smtClean="0"/>
-              <a:t>Questions to ask and </a:t>
-            </a:r>
-            <a:r>
-              <a:rPr lang="en-US" dirty="0" smtClean="0"/>
-              <a:t>explore</a:t>
+              <a:t>Communication </a:t>
+            </a:r>
+            <a:endParaRPr lang="en-US" dirty="0"/>
+          </a:p>
+          <a:p>
+            <a:pPr lvl="2"/>
+            <a:r>
+              <a:rPr lang="en-US" dirty="0"/>
+              <a:t>Slack was used (inconsistently)</a:t>
+            </a:r>
+          </a:p>
+          <a:p>
+            <a:pPr lvl="2"/>
+            <a:r>
+              <a:rPr lang="en-US" dirty="0" smtClean="0"/>
+              <a:t>Met in Class - no other working or planning meetings</a:t>
+            </a:r>
+            <a:endParaRPr lang="en-US" dirty="0" smtClean="0"/>
+          </a:p>
+          <a:p>
+            <a:r>
+              <a:rPr lang="en-US" dirty="0" smtClean="0"/>
+              <a:t>using github became a hindrance</a:t>
             </a:r>
           </a:p>
           <a:p>
             <a:pPr lvl="1"/>
             <a:r>
               <a:rPr lang="en-US" dirty="0" smtClean="0"/>
-              <a:t>What </a:t>
-            </a:r>
-            <a:r>
-              <a:rPr lang="en-US" dirty="0" smtClean="0"/>
-              <a:t>charts with what </a:t>
-            </a:r>
-            <a:r>
-              <a:rPr lang="en-US" dirty="0" smtClean="0"/>
-              <a:t>data</a:t>
-            </a:r>
-          </a:p>
-          <a:p>
-            <a:r>
-              <a:rPr lang="en-US" dirty="0" smtClean="0"/>
-              <a:t>Distributing</a:t>
-            </a:r>
-            <a:endParaRPr lang="en-US" dirty="0"/>
-          </a:p>
-          <a:p>
-            <a:r>
-              <a:rPr lang="en-US" dirty="0" smtClean="0"/>
-              <a:t>Storing </a:t>
-            </a:r>
-            <a:r>
-              <a:rPr lang="en-US" dirty="0" smtClean="0"/>
-              <a:t>and Sharing files</a:t>
-            </a:r>
+              <a:t>Used Google drive to share file</a:t>
+            </a:r>
+            <a:endParaRPr lang="en-US" dirty="0" smtClean="0"/>
           </a:p>
           <a:p>
             <a:endParaRPr lang="en-US" dirty="0"/>
@@ -6688,8 +8074,21 @@
           <a:p>
             <a:r>
               <a:rPr lang="en-US" dirty="0" smtClean="0"/>
-              <a:t>Rachel had the idea when we needed one.</a:t>
-            </a:r>
+              <a:t>Rachel had the </a:t>
+            </a:r>
+            <a:r>
+              <a:rPr lang="en-US" dirty="0" smtClean="0"/>
+              <a:t>Startups idea (when </a:t>
+            </a:r>
+            <a:r>
+              <a:rPr lang="en-US" dirty="0" smtClean="0"/>
+              <a:t>we needed </a:t>
+            </a:r>
+            <a:r>
+              <a:rPr lang="en-US" dirty="0" smtClean="0"/>
+              <a:t>one)</a:t>
+            </a:r>
+            <a:endParaRPr lang="en-US" dirty="0" smtClean="0"/>
           </a:p>
           <a:p>
             <a:r>
@@ -6724,7 +8123,15 @@
             </a:r>
             <a:r>
               <a:rPr lang="en-US" dirty="0" smtClean="0"/>
-              <a:t> – search and file storage/sharing</a:t>
+              <a:t> – </a:t>
+            </a:r>
+            <a:r>
+              <a:rPr lang="en-US" dirty="0" smtClean="0"/>
+              <a:t>search engine </a:t>
+            </a:r>
+            <a:r>
+              <a:rPr lang="en-US" dirty="0" smtClean="0"/>
+              <a:t>and file storage/sharing</a:t>
             </a:r>
           </a:p>
           <a:p>
@@ -7246,7 +8653,11 @@
           <a:p>
             <a:r>
               <a:rPr lang="en-US" dirty="0" smtClean="0"/>
-              <a:t>Team Member Introductions</a:t>
+              <a:t>Our Project </a:t>
+            </a:r>
+            <a:r>
+              <a:rPr lang="en-US" dirty="0" smtClean="0"/>
+              <a:t>–Startups</a:t>
             </a:r>
             <a:endParaRPr lang="en-US" dirty="0"/>
           </a:p>
@@ -7264,39 +8675,83 @@
         </p:nvSpPr>
         <p:spPr/>
         <p:txBody>
-          <a:bodyPr/>
-          <a:lstStyle/>
-          <a:p>
-            <a:pPr algn="ctr"/>
-            <a:r>
-              <a:rPr lang="en-US" dirty="0" smtClean="0"/>
-              <a:t>Fernando </a:t>
-            </a:r>
-            <a:r>
-              <a:rPr lang="en-US" dirty="0"/>
-              <a:t>Figueiredo</a:t>
-            </a:r>
-          </a:p>
-          <a:p>
-            <a:pPr algn="ctr"/>
-            <a:r>
-              <a:rPr lang="en-US" dirty="0"/>
-              <a:t>Christopher Guthrie</a:t>
-            </a:r>
-          </a:p>
-          <a:p>
-            <a:pPr algn="ctr"/>
-            <a:r>
-              <a:rPr lang="en-US" dirty="0"/>
-              <a:t>Rachel Teigen</a:t>
-            </a:r>
+          <a:bodyPr>
+            <a:normAutofit fontScale="92500" lnSpcReduction="20000"/>
+          </a:bodyPr>
+          <a:lstStyle/>
+          <a:p>
+            <a:r>
+              <a:rPr lang="en-US" sz="3000" dirty="0" smtClean="0"/>
+              <a:t>Startup behind ridiculed $400 juicer shuts down</a:t>
+            </a:r>
+          </a:p>
+          <a:p>
+            <a:r>
+              <a:rPr lang="en-US" dirty="0" smtClean="0"/>
+              <a:t>It turns out that selling a $400 Internet-connected juicer isn't a recipe for success after all.</a:t>
+            </a:r>
+          </a:p>
+          <a:p>
+            <a:r>
+              <a:rPr lang="en-US" dirty="0" smtClean="0"/>
+              <a:t>Juicero, a startup that was widely ridiculed for selling an absurdly overpriced juice machine, is shutting down. The news was </a:t>
+            </a:r>
+            <a:r>
+              <a:rPr lang="en-US" dirty="0" smtClean="0">
+                <a:hlinkClick r:id="rId3"/>
+              </a:rPr>
+              <a:t>announced</a:t>
+            </a:r>
+            <a:r>
+              <a:rPr lang="en-US" dirty="0" smtClean="0"/>
+              <a:t> on its website Friday.</a:t>
+            </a:r>
+          </a:p>
+          <a:p>
+            <a:r>
+              <a:rPr lang="en-US" dirty="0" smtClean="0"/>
+              <a:t>The company had raised about $120 million in funding from multiple prominent investors, including Google Ventures and Kleiner Perkins. Juicero's stated goal was to change how we consume fresh, organic foods.</a:t>
+            </a:r>
+          </a:p>
+          <a:p>
+            <a:r>
+              <a:rPr lang="en-US" dirty="0" smtClean="0"/>
+              <a:t>From </a:t>
+            </a:r>
+            <a:r>
+              <a:rPr lang="en-US" dirty="0" smtClean="0">
+                <a:hlinkClick r:id="rId4"/>
+              </a:rPr>
+              <a:t>www.CNN.com</a:t>
+            </a:r>
+            <a:r>
+              <a:rPr lang="en-US" dirty="0" smtClean="0"/>
+              <a:t> - Article by </a:t>
+            </a:r>
+            <a:r>
+              <a:rPr lang="en-US" dirty="0" smtClean="0">
+                <a:hlinkClick r:id="rId5"/>
+              </a:rPr>
+              <a:t>Seth Fiegerman</a:t>
+            </a:r>
+            <a:r>
+              <a:rPr lang="en-US" dirty="0" smtClean="0"/>
+              <a:t>   </a:t>
+            </a:r>
+            <a:r>
+              <a:rPr lang="en-US" dirty="0" smtClean="0">
+                <a:hlinkClick r:id="rId6"/>
+              </a:rPr>
+              <a:t>@sfiegerman</a:t>
+            </a:r>
+            <a:endParaRPr lang="en-US" dirty="0"/>
           </a:p>
         </p:txBody>
       </p:sp>
     </p:spTree>
     <p:extLst>
       <p:ext uri="{BB962C8B-B14F-4D97-AF65-F5344CB8AC3E}">
-        <p14:creationId xmlns:p14="http://schemas.microsoft.com/office/powerpoint/2010/main" val="800033095"/>
+        <p14:creationId xmlns:p14="http://schemas.microsoft.com/office/powerpoint/2010/main" val="1695874451"/>
       </p:ext>
     </p:extLst>
   </p:cSld>
@@ -7346,8 +8801,16 @@
           <a:lstStyle/>
           <a:p>
             <a:r>
-              <a:rPr lang="en-US" dirty="0" smtClean="0"/>
-              <a:t>Our Project -Startups</a:t>
+              <a:rPr lang="en-US" dirty="0"/>
+              <a:t>Data </a:t>
+            </a:r>
+            <a:r>
+              <a:rPr lang="en-US" dirty="0" smtClean="0"/>
+              <a:t>Gathering – </a:t>
+            </a:r>
+            <a:r>
+              <a:rPr lang="en-US" dirty="0" smtClean="0"/>
+              <a:t>User interface ($)</a:t>
             </a:r>
             <a:endParaRPr lang="en-US" dirty="0"/>
           </a:p>
@@ -7363,85 +8826,98 @@
             <p:ph sz="quarter" idx="13"/>
           </p:nvPr>
         </p:nvSpPr>
-        <p:spPr/>
+        <p:spPr>
+          <a:xfrm>
+            <a:off x="913774" y="2140528"/>
+            <a:ext cx="10363826" cy="3650672"/>
+          </a:xfrm>
+        </p:spPr>
         <p:txBody>
           <a:bodyPr>
-            <a:normAutofit fontScale="92500" lnSpcReduction="20000"/>
+            <a:normAutofit/>
           </a:bodyPr>
           <a:lstStyle/>
           <a:p>
             <a:r>
-              <a:rPr lang="en-US" sz="3000" dirty="0" smtClean="0"/>
-              <a:t>Startup behind ridiculed $400 juicer shuts down</a:t>
-            </a:r>
-          </a:p>
-          <a:p>
-            <a:r>
-              <a:rPr lang="en-US" dirty="0" smtClean="0"/>
-              <a:t>It turns out that selling a $400 Internet-connected juicer isn't a recipe for success after all.</a:t>
-            </a:r>
-          </a:p>
-          <a:p>
-            <a:r>
-              <a:rPr lang="en-US" dirty="0" smtClean="0"/>
-              <a:t>Juicero, a startup that was widely ridiculed for selling an absurdly overpriced juice machine, is shutting down. The news was </a:t>
-            </a:r>
-            <a:r>
-              <a:rPr lang="en-US" dirty="0" smtClean="0">
-                <a:hlinkClick r:id="rId2"/>
-              </a:rPr>
-              <a:t>announced</a:t>
-            </a:r>
-            <a:r>
-              <a:rPr lang="en-US" dirty="0" smtClean="0"/>
-              <a:t> on its website Friday.</a:t>
-            </a:r>
-          </a:p>
-          <a:p>
-            <a:r>
-              <a:rPr lang="en-US" dirty="0" smtClean="0"/>
-              <a:t>The company had raised about $120 million in funding from multiple prominent investors, including Google Ventures and Kleiner Perkins. Juicero's stated goal was to change how we consume fresh, organic foods.</a:t>
-            </a:r>
-          </a:p>
-          <a:p>
-            <a:r>
-              <a:rPr lang="en-US" dirty="0" smtClean="0"/>
-              <a:t>From </a:t>
-            </a:r>
-            <a:r>
-              <a:rPr lang="en-US" dirty="0" smtClean="0">
-                <a:hlinkClick r:id="rId3"/>
-              </a:rPr>
-              <a:t>www.CNN.com</a:t>
-            </a:r>
-            <a:r>
-              <a:rPr lang="en-US" dirty="0" smtClean="0"/>
-              <a:t> - Article by </a:t>
-            </a:r>
-            <a:r>
-              <a:rPr lang="en-US" dirty="0" smtClean="0">
-                <a:hlinkClick r:id="rId4"/>
-              </a:rPr>
-              <a:t>Seth Fiegerman</a:t>
-            </a:r>
-            <a:r>
-              <a:rPr lang="en-US" dirty="0" smtClean="0"/>
-              <a:t>   </a:t>
-            </a:r>
-            <a:r>
-              <a:rPr lang="en-US" dirty="0" smtClean="0">
-                <a:hlinkClick r:id="rId5"/>
-              </a:rPr>
-              <a:t>@sfiegerman</a:t>
-            </a:r>
-            <a:endParaRPr lang="en-US" dirty="0"/>
+              <a:rPr lang="en-US" dirty="0" smtClean="0"/>
+              <a:t>One Team member purchased a license for one month</a:t>
+            </a:r>
+          </a:p>
+          <a:p>
+            <a:r>
+              <a:rPr lang="en-US" dirty="0" smtClean="0"/>
+              <a:t>Graphical </a:t>
+            </a:r>
+            <a:r>
+              <a:rPr lang="en-US" dirty="0" smtClean="0"/>
+              <a:t>user interface to </a:t>
+            </a:r>
+            <a:r>
+              <a:rPr lang="en-US" dirty="0" smtClean="0"/>
+              <a:t>search and build queries </a:t>
+            </a:r>
+            <a:r>
+              <a:rPr lang="en-US" dirty="0"/>
+              <a:t> </a:t>
+            </a:r>
+            <a:endParaRPr lang="en-US" dirty="0" smtClean="0"/>
+          </a:p>
+          <a:p>
+            <a:r>
+              <a:rPr lang="en-US" dirty="0" smtClean="0"/>
+              <a:t>Downloaded batches of 1000 records as </a:t>
+            </a:r>
+            <a:r>
+              <a:rPr lang="en-US" dirty="0" smtClean="0"/>
+              <a:t>csv files</a:t>
+            </a:r>
+            <a:endParaRPr lang="en-US" dirty="0" smtClean="0"/>
+          </a:p>
+          <a:p>
+            <a:pPr lvl="1"/>
+            <a:r>
+              <a:rPr lang="en-US" dirty="0" smtClean="0"/>
+              <a:t>Companies.csv</a:t>
+            </a:r>
+          </a:p>
+          <a:p>
+            <a:pPr lvl="1"/>
+            <a:r>
+              <a:rPr lang="en-US" dirty="0" smtClean="0"/>
+              <a:t>Funding_rounds.csv</a:t>
+            </a:r>
+          </a:p>
+          <a:p>
+            <a:pPr lvl="1"/>
+            <a:r>
+              <a:rPr lang="en-US" dirty="0" smtClean="0"/>
+              <a:t>Organization.csv – pre-made 103mb file</a:t>
+            </a:r>
+          </a:p>
+          <a:p>
+            <a:r>
+              <a:rPr lang="en-US" dirty="0" smtClean="0"/>
+              <a:t>API access was limited for unknown reasons</a:t>
+            </a:r>
+          </a:p>
+          <a:p>
+            <a:pPr lvl="1"/>
+            <a:r>
+              <a:rPr lang="en-US" dirty="0" smtClean="0"/>
+              <a:t>Crunchbase support was unresponsive to requests for help</a:t>
+            </a:r>
+            <a:endParaRPr lang="en-US" dirty="0"/>
+          </a:p>
+          <a:p>
+            <a:pPr lvl="1"/>
+            <a:endParaRPr lang="en-US" dirty="0" smtClean="0"/>
           </a:p>
         </p:txBody>
       </p:sp>
     </p:spTree>
     <p:extLst>
       <p:ext uri="{BB962C8B-B14F-4D97-AF65-F5344CB8AC3E}">
-        <p14:creationId xmlns:p14="http://schemas.microsoft.com/office/powerpoint/2010/main" val="1695874451"/>
+        <p14:creationId xmlns:p14="http://schemas.microsoft.com/office/powerpoint/2010/main" val="2739601734"/>
       </p:ext>
     </p:extLst>
   </p:cSld>
@@ -7492,7 +8968,7 @@
           <a:p>
             <a:r>
               <a:rPr lang="en-US" dirty="0" smtClean="0"/>
-              <a:t>Data Gathering – User interface</a:t>
+              <a:t>Data Gathering – API interface</a:t>
             </a:r>
             <a:endParaRPr lang="en-US" dirty="0"/>
           </a:p>
@@ -7513,51 +8989,113 @@
           <a:bodyPr/>
           <a:lstStyle/>
           <a:p>
-            <a:r>
-              <a:rPr lang="en-US" dirty="0" smtClean="0"/>
-              <a:t>User interface for search/queries ($)</a:t>
-            </a:r>
-          </a:p>
-          <a:p>
-            <a:pPr lvl="1"/>
-            <a:r>
-              <a:rPr lang="en-US" dirty="0" smtClean="0"/>
-              <a:t>Graphical user interface to search and build queries</a:t>
-            </a:r>
-          </a:p>
-          <a:p>
-            <a:pPr lvl="1"/>
-            <a:r>
-              <a:rPr lang="en-US" dirty="0" smtClean="0"/>
-              <a:t>Companies.csv</a:t>
-            </a:r>
-          </a:p>
-          <a:p>
-            <a:pPr lvl="1"/>
-            <a:r>
-              <a:rPr lang="en-US" dirty="0" smtClean="0"/>
-              <a:t>Funding_rounds.csv</a:t>
-            </a:r>
-          </a:p>
-          <a:p>
-            <a:pPr lvl="1"/>
-            <a:r>
-              <a:rPr lang="en-US" dirty="0" smtClean="0"/>
-              <a:t>Organization.csv</a:t>
-            </a:r>
-          </a:p>
-          <a:p>
-            <a:pPr lvl="1"/>
+            <a:pPr marL="228600" lvl="1">
+              <a:spcBef>
+                <a:spcPts val="1000"/>
+              </a:spcBef>
+            </a:pPr>
+            <a:r>
+              <a:rPr lang="en-US" dirty="0" smtClean="0"/>
+              <a:t>Free api was limited but we learned how to extract api data</a:t>
+            </a:r>
             <a:endParaRPr lang="en-US" dirty="0" smtClean="0"/>
           </a:p>
+          <a:p>
+            <a:pPr marL="228600" lvl="1">
+              <a:spcBef>
+                <a:spcPts val="1000"/>
+              </a:spcBef>
+            </a:pPr>
+            <a:r>
+              <a:rPr lang="en-US" dirty="0" smtClean="0"/>
+              <a:t>print</a:t>
+            </a:r>
+            <a:r>
+              <a:rPr lang="en-US" dirty="0" smtClean="0"/>
+              <a:t>("The Crunchbase API responded with: " + json.dumps(org_json, indent=2) + ".")</a:t>
+            </a:r>
+          </a:p>
+          <a:p>
+            <a:pPr marL="228600" lvl="1">
+              <a:spcBef>
+                <a:spcPts val="1000"/>
+              </a:spcBef>
+            </a:pPr>
+            <a:r>
+              <a:rPr lang="en-US" dirty="0" smtClean="0"/>
+              <a:t>Created org_df </a:t>
+            </a:r>
+            <a:r>
+              <a:rPr lang="en-US" dirty="0" smtClean="0"/>
+              <a:t>= pd.DataFrame() </a:t>
+            </a:r>
+            <a:r>
+              <a:rPr lang="en-US" dirty="0" smtClean="0"/>
+              <a:t>with empty columns</a:t>
+            </a:r>
+            <a:endParaRPr lang="en-US" dirty="0" smtClean="0"/>
+          </a:p>
+          <a:p>
+            <a:pPr marL="685800" lvl="2">
+              <a:spcBef>
+                <a:spcPts val="1000"/>
+              </a:spcBef>
+            </a:pPr>
+            <a:r>
+              <a:rPr lang="en-US" dirty="0" smtClean="0"/>
+              <a:t>oname  </a:t>
+            </a:r>
+            <a:r>
+              <a:rPr lang="en-US" dirty="0" smtClean="0"/>
+              <a:t>= org_json["data"]["items"][i]["properties"]["name"]</a:t>
+            </a:r>
+          </a:p>
+          <a:p>
+            <a:pPr marL="685800" lvl="2">
+              <a:spcBef>
+                <a:spcPts val="1000"/>
+              </a:spcBef>
+            </a:pPr>
+            <a:r>
+              <a:rPr lang="en-US" dirty="0" smtClean="0"/>
+              <a:t>org_df.set_value(index, "name", oname)</a:t>
+            </a:r>
+          </a:p>
+          <a:p>
+            <a:pPr marL="228600" lvl="1">
+              <a:spcBef>
+                <a:spcPts val="1000"/>
+              </a:spcBef>
+            </a:pPr>
+            <a:r>
+              <a:rPr lang="en-US" dirty="0" smtClean="0"/>
+              <a:t>Even with paid license we couldn’t access </a:t>
+            </a:r>
+            <a:r>
+              <a:rPr lang="en-US" dirty="0" smtClean="0"/>
+              <a:t>all json </a:t>
+            </a:r>
+            <a:r>
+              <a:rPr lang="en-US" dirty="0" smtClean="0"/>
+              <a:t>structures</a:t>
+            </a:r>
+            <a:endParaRPr lang="en-US" dirty="0" smtClean="0"/>
+          </a:p>
+          <a:p>
+            <a:pPr marL="685800" lvl="2">
+              <a:spcBef>
+                <a:spcPts val="1000"/>
+              </a:spcBef>
+            </a:pPr>
+            <a:r>
+              <a:rPr lang="en-US" dirty="0" smtClean="0"/>
+              <a:t>This issue was never resolved</a:t>
+            </a:r>
+            <a:endParaRPr lang="en-US" dirty="0"/>
+          </a:p>
         </p:txBody>
       </p:sp>
     </p:spTree>
-    <p:extLst>
-      <p:ext uri="{BB962C8B-B14F-4D97-AF65-F5344CB8AC3E}">
-        <p14:creationId xmlns:p14="http://schemas.microsoft.com/office/powerpoint/2010/main" val="2739601734"/>
-      </p:ext>
-    </p:extLst>
   </p:cSld>
   <p:clrMapOvr>
     <a:masterClrMapping/>
@@ -7606,8 +9144,11 @@
           <a:p>
             <a:r>
               <a:rPr lang="en-US" dirty="0" smtClean="0"/>
-              <a:t>Data Gathering – API interface</a:t>
-            </a:r>
+              <a:t>Data Gathering – Screen Scraping</a:t>
+            </a:r>
+            <a:br>
+              <a:rPr lang="en-US" dirty="0" smtClean="0"/>
+            </a:br>
             <a:endParaRPr lang="en-US" dirty="0"/>
           </a:p>
         </p:txBody>
@@ -7622,83 +9163,89 @@
             <p:ph sz="quarter" idx="13"/>
           </p:nvPr>
         </p:nvSpPr>
-        <p:spPr/>
-        <p:txBody>
-          <a:bodyPr/>
-          <a:lstStyle/>
-          <a:p>
-            <a:pPr marL="228600" lvl="1">
-              <a:spcBef>
-                <a:spcPts val="1000"/>
-              </a:spcBef>
+        <p:spPr>
+          <a:xfrm>
+            <a:off x="913774" y="1895445"/>
+            <a:ext cx="10363826" cy="3757211"/>
+          </a:xfrm>
+        </p:spPr>
+        <p:txBody>
+          <a:bodyPr>
+            <a:normAutofit/>
+          </a:bodyPr>
+          <a:lstStyle/>
+          <a:p>
+            <a:r>
+              <a:rPr lang="en-US" dirty="0" smtClean="0"/>
+              <a:t>browser.visit(t_url)</a:t>
+            </a:r>
+          </a:p>
+          <a:p>
+            <a:r>
+              <a:rPr lang="en-US" dirty="0" smtClean="0"/>
+              <a:t>time.sleep(45)</a:t>
+            </a:r>
+            <a:endParaRPr lang="en-US" dirty="0" smtClean="0"/>
+          </a:p>
+          <a:p>
+            <a:r>
+              <a:rPr lang="en-US" dirty="0" smtClean="0"/>
+              <a:t> soup = BeautifulSoup(html, "html.parser")</a:t>
+            </a:r>
+          </a:p>
+          <a:p>
+            <a:r>
+              <a:rPr lang="en-US" dirty="0" smtClean="0"/>
+              <a:t> Print(soup.prettify</a:t>
+            </a:r>
+            <a:r>
+              <a:rPr lang="en-US" dirty="0" smtClean="0"/>
+              <a:t>()) – to read json structure</a:t>
+            </a:r>
+            <a:endParaRPr lang="en-US" dirty="0" smtClean="0"/>
+          </a:p>
+          <a:p>
+            <a:r>
+              <a:rPr lang="en-US" dirty="0" smtClean="0"/>
+              <a:t>for line in soup.findAll(‘Html tag’, class_=‘engagement value’)</a:t>
+            </a:r>
+          </a:p>
+          <a:p>
+            <a:r>
+              <a:rPr lang="en-US" dirty="0" smtClean="0"/>
+              <a:t>org2_df.set_value(index, "Total Visits", line.get_Text</a:t>
+            </a:r>
+            <a:r>
+              <a:rPr lang="en-US" dirty="0" smtClean="0"/>
+              <a:t>())</a:t>
+            </a:r>
+          </a:p>
+          <a:p>
+            <a:r>
+              <a:rPr lang="en-US" dirty="0" smtClean="0"/>
+              <a:t>This method required a lot of work</a:t>
+            </a:r>
+            <a:endParaRPr lang="en-US" dirty="0" smtClean="0"/>
+          </a:p>
+          <a:p>
+            <a:pPr lvl="1">
+              <a:buNone/>
             </a:pPr>
-            <a:r>
-              <a:rPr lang="en-US" dirty="0" smtClean="0"/>
-              <a:t>print("The Crunchbase API responded with: " + json.dumps(org_json, indent=2) + ".")</a:t>
-            </a:r>
-          </a:p>
-          <a:p>
-            <a:pPr marL="228600" lvl="1">
-              <a:spcBef>
-                <a:spcPts val="1000"/>
-              </a:spcBef>
+            <a:endParaRPr lang="en-US" u="sng" dirty="0" smtClean="0">
+              <a:hlinkClick r:id="rId3"/>
+            </a:endParaRPr>
+          </a:p>
+          <a:p>
+            <a:pPr lvl="1">
+              <a:buNone/>
             </a:pPr>
-            <a:r>
-              <a:rPr lang="en-US" dirty="0" smtClean="0"/>
-              <a:t>org_df = pd.DataFrame() </a:t>
-            </a:r>
-          </a:p>
-          <a:p>
-            <a:pPr marL="228600" lvl="1">
-              <a:spcBef>
-                <a:spcPts val="1000"/>
-              </a:spcBef>
+            <a:endParaRPr lang="en-US" dirty="0" smtClean="0"/>
+          </a:p>
+          <a:p>
+            <a:pPr>
+              <a:buNone/>
             </a:pPr>
-            <a:r>
-              <a:rPr lang="en-US" dirty="0" smtClean="0"/>
-              <a:t>org_df["name"] = "“</a:t>
-            </a:r>
-          </a:p>
-          <a:p>
-            <a:pPr marL="228600" lvl="1">
-              <a:spcBef>
-                <a:spcPts val="1000"/>
-              </a:spcBef>
-            </a:pPr>
-            <a:r>
-              <a:rPr lang="en-US" dirty="0" smtClean="0"/>
-              <a:t>oname  = org_json["data"]["items"][i]["properties"]["name"]</a:t>
-            </a:r>
-          </a:p>
-          <a:p>
-            <a:pPr marL="228600" lvl="1">
-              <a:spcBef>
-                <a:spcPts val="1000"/>
-              </a:spcBef>
-            </a:pPr>
-            <a:r>
-              <a:rPr lang="en-US" dirty="0" smtClean="0"/>
-              <a:t>org_df.set_value(index, "name", oname)</a:t>
-            </a:r>
-          </a:p>
-          <a:p>
-            <a:pPr marL="228600" lvl="1">
-              <a:spcBef>
-                <a:spcPts val="1000"/>
-              </a:spcBef>
-            </a:pPr>
-            <a:r>
-              <a:rPr lang="en-US" dirty="0" smtClean="0"/>
-              <a:t>Issues with accessing all json structures – Crunchbase support was no help!</a:t>
-            </a:r>
-          </a:p>
-          <a:p>
-            <a:pPr marL="228600" lvl="1">
-              <a:spcBef>
-                <a:spcPts val="1000"/>
-              </a:spcBef>
-            </a:pPr>
-            <a:endParaRPr lang="en-US" dirty="0"/>
+            <a:endParaRPr lang="en-US" dirty="0" smtClean="0"/>
           </a:p>
         </p:txBody>
       </p:sp>
@@ -7751,11 +9298,8 @@
           <a:p>
             <a:r>
               <a:rPr lang="en-US" dirty="0" smtClean="0"/>
-              <a:t>Data Gathering – Screen Scraping</a:t>
-            </a:r>
-            <a:br>
-              <a:rPr lang="en-US" dirty="0" smtClean="0"/>
-            </a:br>
+              <a:t>Data cleansing</a:t>
+            </a:r>
             <a:endParaRPr lang="en-US" dirty="0"/>
           </a:p>
         </p:txBody>
@@ -7770,76 +9314,39 @@
             <p:ph sz="quarter" idx="13"/>
           </p:nvPr>
         </p:nvSpPr>
-        <p:spPr>
-          <a:xfrm>
-            <a:off x="913774" y="1749971"/>
-            <a:ext cx="10363826" cy="4430111"/>
-          </a:xfrm>
-        </p:spPr>
-        <p:txBody>
-          <a:bodyPr>
-            <a:normAutofit/>
-          </a:bodyPr>
-          <a:lstStyle/>
-          <a:p>
-            <a:r>
-              <a:rPr lang="en-US" dirty="0" smtClean="0"/>
-              <a:t>browser.visit(t_url)</a:t>
-            </a:r>
-          </a:p>
-          <a:p>
-            <a:r>
-              <a:rPr lang="en-US" dirty="0" smtClean="0"/>
-              <a:t>time.sleep(20)</a:t>
-            </a:r>
-          </a:p>
-          <a:p>
-            <a:r>
-              <a:rPr lang="en-US" dirty="0" smtClean="0"/>
-              <a:t> soup = BeautifulSoup(html, "html.parser")</a:t>
-            </a:r>
-          </a:p>
-          <a:p>
-            <a:r>
-              <a:rPr lang="en-US" dirty="0" smtClean="0"/>
-              <a:t> Print(soup.prettify())</a:t>
-            </a:r>
-          </a:p>
-          <a:p>
-            <a:r>
-              <a:rPr lang="en-US" dirty="0" smtClean="0"/>
-              <a:t>for line in soup.findAll(‘Html tag’, class_=‘engagement value’)</a:t>
-            </a:r>
-          </a:p>
-          <a:p>
-            <a:r>
-              <a:rPr lang="en-US" dirty="0" smtClean="0"/>
-              <a:t>org2_df.set_value(index, "Total Visits", line.get_Text())</a:t>
-            </a:r>
-          </a:p>
-          <a:p>
-            <a:pPr lvl="1">
-              <a:buNone/>
-            </a:pPr>
-            <a:endParaRPr lang="en-US" u="sng" dirty="0" smtClean="0">
-              <a:hlinkClick r:id="rId2"/>
-            </a:endParaRPr>
-          </a:p>
-          <a:p>
-            <a:pPr lvl="1">
-              <a:buNone/>
-            </a:pPr>
-            <a:endParaRPr lang="en-US" dirty="0" smtClean="0"/>
-          </a:p>
-          <a:p>
-            <a:pPr>
-              <a:buNone/>
-            </a:pPr>
-            <a:endParaRPr lang="en-US" dirty="0" smtClean="0"/>
+        <p:spPr/>
+        <p:txBody>
+          <a:bodyPr/>
+          <a:lstStyle/>
+          <a:p>
+            <a:r>
+              <a:rPr lang="en-US" dirty="0" smtClean="0"/>
+              <a:t>Converting currency strings to floats highlighted currency issues which were the caused of conversion problems.  we ended up restricting our data extracts to us investments.</a:t>
+            </a:r>
+          </a:p>
+          <a:p>
+            <a:r>
+              <a:rPr lang="en-US" dirty="0" smtClean="0"/>
+              <a:t>While cleaning the data for company website urls, we learned that multiple urls were possible for one company.  We had to cleanse the data multiple times to get down to one company and one or more valid entries for each funding type.</a:t>
+            </a:r>
+          </a:p>
+          <a:p>
+            <a:r>
+              <a:rPr lang="en-US" dirty="0" smtClean="0"/>
+              <a:t>Some pre-packaged csv files were too large for use in Github with additional software installations.</a:t>
+            </a:r>
+          </a:p>
+          <a:p>
+            <a:endParaRPr lang="en-US" dirty="0"/>
           </a:p>
         </p:txBody>
       </p:sp>
     </p:spTree>
+    <p:extLst>
+      <p:ext uri="{BB962C8B-B14F-4D97-AF65-F5344CB8AC3E}">
+        <p14:creationId xmlns:p14="http://schemas.microsoft.com/office/powerpoint/2010/main" val="1795660759"/>
+      </p:ext>
+    </p:extLst>
   </p:cSld>
   <p:clrMapOvr>
     <a:masterClrMapping/>
@@ -7888,7 +9395,11 @@
           <a:p>
             <a:r>
               <a:rPr lang="en-US" dirty="0" smtClean="0"/>
-              <a:t>Total Funding Percentages by Type</a:t>
+              <a:t>Funding Type </a:t>
+            </a:r>
+            <a:r>
+              <a:rPr lang="en-US" dirty="0" smtClean="0"/>
+              <a:t>by percentage</a:t>
             </a:r>
             <a:endParaRPr lang="en-US" dirty="0"/>
           </a:p>
@@ -7896,7 +9407,7 @@
       </p:sp>
       <p:pic>
         <p:nvPicPr>
-          <p:cNvPr id="8" name="Content Placeholder 7" descr="funding_type_sum_pie_chart.png"/>
+          <p:cNvPr id="7" name="Content Placeholder 6"/>
           <p:cNvPicPr>
             <a:picLocks noGrp="1" noChangeAspect="1"/>
           </p:cNvPicPr>
@@ -7905,22 +9416,28 @@
           </p:nvPr>
         </p:nvPicPr>
         <p:blipFill>
-          <a:blip r:embed="rId2"/>
+          <a:blip r:embed="rId3">
+            <a:extLst>
+              <a:ext uri="{28A0092B-C50C-407E-A947-70E740481C1C}">
+                <a14:useLocalDpi xmlns:a14="http://schemas.microsoft.com/office/drawing/2010/main" val="0"/>
+              </a:ext>
+            </a:extLst>
+          </a:blip>
           <a:stretch>
             <a:fillRect/>
           </a:stretch>
         </p:blipFill>
         <p:spPr>
           <a:xfrm>
-            <a:off x="3637281" y="1889761"/>
-            <a:ext cx="4556918" cy="3881120"/>
+            <a:off x="3969327" y="2214695"/>
+            <a:ext cx="4384964" cy="3791250"/>
           </a:xfrm>
         </p:spPr>
       </p:pic>
     </p:spTree>
     <p:extLst>
       <p:ext uri="{BB962C8B-B14F-4D97-AF65-F5344CB8AC3E}">
-        <p14:creationId xmlns:p14="http://schemas.microsoft.com/office/powerpoint/2010/main" val="3584956998"/>
+        <p14:creationId xmlns:p14="http://schemas.microsoft.com/office/powerpoint/2010/main" val="811571513"/>
       </p:ext>
     </p:extLst>
   </p:cSld>
@@ -7971,7 +9488,15 @@
           <a:p>
             <a:r>
               <a:rPr lang="en-US" dirty="0" smtClean="0"/>
-              <a:t>Funding Type percentages</a:t>
+              <a:t>Funding </a:t>
+            </a:r>
+            <a:r>
+              <a:rPr lang="en-US" dirty="0"/>
+              <a:t>type </a:t>
+            </a:r>
+            <a:r>
+              <a:rPr lang="en-US" dirty="0" smtClean="0"/>
+              <a:t>Total Funding Percentages </a:t>
             </a:r>
             <a:endParaRPr lang="en-US" dirty="0"/>
           </a:p>
@@ -7979,7 +9504,7 @@
       </p:sp>
       <p:pic>
         <p:nvPicPr>
-          <p:cNvPr id="6" name="Content Placeholder 5" descr="funding_type_count_pie_chart.png"/>
+          <p:cNvPr id="6" name="Content Placeholder 5"/>
           <p:cNvPicPr>
             <a:picLocks noGrp="1" noChangeAspect="1"/>
           </p:cNvPicPr>
@@ -7988,22 +9513,28 @@
           </p:nvPr>
         </p:nvPicPr>
         <p:blipFill>
-          <a:blip r:embed="rId2"/>
+          <a:blip r:embed="rId3">
+            <a:extLst>
+              <a:ext uri="{28A0092B-C50C-407E-A947-70E740481C1C}">
+                <a14:useLocalDpi xmlns:a14="http://schemas.microsoft.com/office/drawing/2010/main" val="0"/>
+              </a:ext>
+            </a:extLst>
+          </a:blip>
           <a:stretch>
             <a:fillRect/>
           </a:stretch>
         </p:blipFill>
         <p:spPr>
           <a:xfrm>
-            <a:off x="4079081" y="1950721"/>
-            <a:ext cx="4170839" cy="3759200"/>
+            <a:off x="3383973" y="2214694"/>
+            <a:ext cx="5424053" cy="3812032"/>
           </a:xfrm>
         </p:spPr>
       </p:pic>
     </p:spTree>
     <p:extLst>
       <p:ext uri="{BB962C8B-B14F-4D97-AF65-F5344CB8AC3E}">
-        <p14:creationId xmlns:p14="http://schemas.microsoft.com/office/powerpoint/2010/main" val="811571513"/>
+        <p14:creationId xmlns:p14="http://schemas.microsoft.com/office/powerpoint/2010/main" val="3584956998"/>
       </p:ext>
     </p:extLst>
   </p:cSld>
@@ -8282,4 +9813,265 @@
     </a:ext>
   </a:extLst>
 </a:theme>
+</file>
+
+<file path=ppt/theme/theme2.xml><?xml version="1.0" encoding="utf-8"?>
+<a:theme xmlns:a="http://schemas.openxmlformats.org/drawingml/2006/main" name="Office Theme">
+  <a:themeElements>
+    <a:clrScheme name="Office">
+      <a:dk1>
+        <a:sysClr val="windowText" lastClr="000000"/>
+      </a:dk1>
+      <a:lt1>
+        <a:sysClr val="window" lastClr="FFFFFF"/>
+      </a:lt1>
+      <a:dk2>
+        <a:srgbClr val="44546A"/>
+      </a:dk2>
+      <a:lt2>
+        <a:srgbClr val="E7E6E6"/>
+      </a:lt2>
+      <a:accent1>
+        <a:srgbClr val="5B9BD5"/>
+      </a:accent1>
+      <a:accent2>
+        <a:srgbClr val="ED7D31"/>
+      </a:accent2>
+      <a:accent3>
+        <a:srgbClr val="A5A5A5"/>
+      </a:accent3>
+      <a:accent4>
+        <a:srgbClr val="FFC000"/>
+      </a:accent4>
+      <a:accent5>
+        <a:srgbClr val="4472C4"/>
+      </a:accent5>
+      <a:accent6>
+        <a:srgbClr val="70AD47"/>
+      </a:accent6>
+      <a:hlink>
+        <a:srgbClr val="0563C1"/>
+      </a:hlink>
+      <a:folHlink>
+        <a:srgbClr val="954F72"/>
+      </a:folHlink>
+    </a:clrScheme>
+    <a:fontScheme name="Office">
+      <a:majorFont>
+        <a:latin typeface="Calibri Light" panose="020F0302020204030204"/>
+        <a:ea typeface=""/>
+        <a:cs typeface=""/>
+        <a:font script="Jpan" typeface="ＭＳ Ｐゴシック"/>
+        <a:font script="Hang" typeface="맑은 고딕"/>
+        <a:font script="Hans" typeface="宋体"/>
+        <a:font script="Hant" typeface="新細明體"/>
+        <a:font script="Arab" typeface="Times New Roman"/>
+        <a:font script="Hebr" typeface="Times New Roman"/>
+        <a:font script="Thai" typeface="Angsana New"/>
+        <a:font script="Ethi" typeface="Nyala"/>
+        <a:font script="Beng" typeface="Vrinda"/>
+        <a:font script="Gujr" typeface="Shruti"/>
+        <a:font script="Khmr" typeface="MoolBoran"/>
+        <a:font script="Knda" typeface="Tunga"/>
+        <a:font script="Guru" typeface="Raavi"/>
+        <a:font script="Cans" typeface="Euphemia"/>
+        <a:font script="Cher" typeface="Plantagenet Cherokee"/>
+        <a:font script="Yiii" typeface="Microsoft Yi Baiti"/>
+        <a:font script="Tibt" typeface="Microsoft Himalaya"/>
+        <a:font script="Thaa" typeface="MV Boli"/>
+        <a:font script="Deva" typeface="Mangal"/>
+        <a:font script="Telu" typeface="Gautami"/>
+        <a:font script="Taml" typeface="Latha"/>
+        <a:font script="Syrc" typeface="Estrangelo Edessa"/>
+        <a:font script="Orya" typeface="Kalinga"/>
+        <a:font script="Mlym" typeface="Kartika"/>
+        <a:font script="Laoo" typeface="DokChampa"/>
+        <a:font script="Sinh" typeface="Iskoola Pota"/>
+        <a:font script="Mong" typeface="Mongolian Baiti"/>
+        <a:font script="Viet" typeface="Times New Roman"/>
+        <a:font script="Uigh" typeface="Microsoft Uighur"/>
+        <a:font script="Geor" typeface="Sylfaen"/>
+      </a:majorFont>
+      <a:minorFont>
+        <a:latin typeface="Calibri" panose="020F0502020204030204"/>
+        <a:ea typeface=""/>
+        <a:cs typeface=""/>
+        <a:font script="Jpan" typeface="ＭＳ Ｐゴシック"/>
+        <a:font script="Hang" typeface="맑은 고딕"/>
+        <a:font script="Hans" typeface="宋体"/>
+        <a:font script="Hant" typeface="新細明體"/>
+        <a:font script="Arab" typeface="Arial"/>
+        <a:font script="Hebr" typeface="Arial"/>
+        <a:font script="Thai" typeface="Cordia New"/>
+        <a:font script="Ethi" typeface="Nyala"/>
+        <a:font script="Beng" typeface="Vrinda"/>
+        <a:font script="Gujr" typeface="Shruti"/>
+        <a:font script="Khmr" typeface="DaunPenh"/>
+        <a:font script="Knda" typeface="Tunga"/>
+        <a:font script="Guru" typeface="Raavi"/>
+        <a:font script="Cans" typeface="Euphemia"/>
+        <a:font script="Cher" typeface="Plantagenet Cherokee"/>
+        <a:font script="Yiii" typeface="Microsoft Yi Baiti"/>
+        <a:font script="Tibt" typeface="Microsoft Himalaya"/>
+        <a:font script="Thaa" typeface="MV Boli"/>
+        <a:font script="Deva" typeface="Mangal"/>
+        <a:font script="Telu" typeface="Gautami"/>
+        <a:font script="Taml" typeface="Latha"/>
+        <a:font script="Syrc" typeface="Estrangelo Edessa"/>
+        <a:font script="Orya" typeface="Kalinga"/>
+        <a:font script="Mlym" typeface="Kartika"/>
+        <a:font script="Laoo" typeface="DokChampa"/>
+        <a:font script="Sinh" typeface="Iskoola Pota"/>
+        <a:font script="Mong" typeface="Mongolian Baiti"/>
+        <a:font script="Viet" typeface="Arial"/>
+        <a:font script="Uigh" typeface="Microsoft Uighur"/>
+        <a:font script="Geor" typeface="Sylfaen"/>
+      </a:minorFont>
+    </a:fontScheme>
+    <a:fmtScheme name="Office">
+      <a:fillStyleLst>
+        <a:solidFill>
+          <a:schemeClr val="phClr"/>
+        </a:solidFill>
+        <a:gradFill rotWithShape="1">
+          <a:gsLst>
+            <a:gs pos="0">
+              <a:schemeClr val="phClr">
+                <a:lumMod val="110000"/>
+                <a:satMod val="105000"/>
+                <a:tint val="67000"/>
+              </a:schemeClr>
+            </a:gs>
+            <a:gs pos="50000">
+              <a:schemeClr val="phClr">
+                <a:lumMod val="105000"/>
+                <a:satMod val="103000"/>
+                <a:tint val="73000"/>
+              </a:schemeClr>
+            </a:gs>
+            <a:gs pos="100000">
+              <a:schemeClr val="phClr">
+                <a:lumMod val="105000"/>
+                <a:satMod val="109000"/>
+                <a:tint val="81000"/>
+              </a:schemeClr>
+            </a:gs>
+          </a:gsLst>
+          <a:lin ang="5400000" scaled="0"/>
+        </a:gradFill>
+        <a:gradFill rotWithShape="1">
+          <a:gsLst>
+            <a:gs pos="0">
+              <a:schemeClr val="phClr">
+                <a:satMod val="103000"/>
+                <a:lumMod val="102000"/>
+                <a:tint val="94000"/>
+              </a:schemeClr>
+            </a:gs>
+            <a:gs pos="50000">
+              <a:schemeClr val="phClr">
+                <a:satMod val="110000"/>
+                <a:lumMod val="100000"/>
+                <a:shade val="100000"/>
+              </a:schemeClr>
+            </a:gs>
+            <a:gs pos="100000">
+              <a:schemeClr val="phClr">
+                <a:lumMod val="99000"/>
+                <a:satMod val="120000"/>
+                <a:shade val="78000"/>
+              </a:schemeClr>
+            </a:gs>
+          </a:gsLst>
+          <a:lin ang="5400000" scaled="0"/>
+        </a:gradFill>
+      </a:fillStyleLst>
+      <a:lnStyleLst>
+        <a:ln w="6350" cap="flat" cmpd="sng" algn="ctr">
+          <a:solidFill>
+            <a:schemeClr val="phClr"/>
+          </a:solidFill>
+          <a:prstDash val="solid"/>
+          <a:miter lim="800000"/>
+        </a:ln>
+        <a:ln w="12700" cap="flat" cmpd="sng" algn="ctr">
+          <a:solidFill>
+            <a:schemeClr val="phClr"/>
+          </a:solidFill>
+          <a:prstDash val="solid"/>
+          <a:miter lim="800000"/>
+        </a:ln>
+        <a:ln w="19050" cap="flat" cmpd="sng" algn="ctr">
+          <a:solidFill>
+            <a:schemeClr val="phClr"/>
+          </a:solidFill>
+          <a:prstDash val="solid"/>
+          <a:miter lim="800000"/>
+        </a:ln>
+      </a:lnStyleLst>
+      <a:effectStyleLst>
+        <a:effectStyle>
+          <a:effectLst/>
+        </a:effectStyle>
+        <a:effectStyle>
+          <a:effectLst/>
+        </a:effectStyle>
+        <a:effectStyle>
+          <a:effectLst>
+            <a:outerShdw blurRad="57150" dist="19050" dir="5400000" algn="ctr" rotWithShape="0">
+              <a:srgbClr val="000000">
+                <a:alpha val="63000"/>
+              </a:srgbClr>
+            </a:outerShdw>
+          </a:effectLst>
+        </a:effectStyle>
+      </a:effectStyleLst>
+      <a:bgFillStyleLst>
+        <a:solidFill>
+          <a:schemeClr val="phClr"/>
+        </a:solidFill>
+        <a:solidFill>
+          <a:schemeClr val="phClr">
+            <a:tint val="95000"/>
+            <a:satMod val="170000"/>
+          </a:schemeClr>
+        </a:solidFill>
+        <a:gradFill rotWithShape="1">
+          <a:gsLst>
+            <a:gs pos="0">
+              <a:schemeClr val="phClr">
+                <a:tint val="93000"/>
+                <a:satMod val="150000"/>
+                <a:shade val="98000"/>
+                <a:lumMod val="102000"/>
+              </a:schemeClr>
+            </a:gs>
+            <a:gs pos="50000">
+              <a:schemeClr val="phClr">
+                <a:tint val="98000"/>
+                <a:satMod val="130000"/>
+                <a:shade val="90000"/>
+                <a:lumMod val="103000"/>
+              </a:schemeClr>
+            </a:gs>
+            <a:gs pos="100000">
+              <a:schemeClr val="phClr">
+                <a:shade val="63000"/>
+                <a:satMod val="120000"/>
+              </a:schemeClr>
+            </a:gs>
+          </a:gsLst>
+          <a:lin ang="5400000" scaled="0"/>
+        </a:gradFill>
+      </a:bgFillStyleLst>
+    </a:fmtScheme>
+  </a:themeElements>
+  <a:objectDefaults/>
+  <a:extraClrSchemeLst/>
+  <a:extLst>
+    <a:ext uri="{05A4C25C-085E-4340-85A3-A5531E510DB2}">
+      <thm15:themeFamily xmlns:thm15="http://schemas.microsoft.com/office/thememl/2012/main" name="Office Theme" id="{62F939B6-93AF-4DB8-9C6B-D6C7DFDC589F}" vid="{4A3C46E8-61CC-4603-A589-7422A47A8E4A}"/>
+    </a:ext>
+  </a:extLst>
+</a:theme>
 </file>
</xml_diff>

<commit_message>
Save changes 09/12 7:58am
</commit_message>
<xml_diff>
--- a/PowerPoint/Data visualization & Analytics_chrisg.pptx
+++ b/PowerPoint/Data visualization & Analytics_chrisg.pptx
@@ -5,7 +5,7 @@
     <p:sldMasterId id="2147483669" r:id="rId1"/>
   </p:sldMasterIdLst>
   <p:notesMasterIdLst>
-    <p:notesMasterId r:id="rId15"/>
+    <p:notesMasterId r:id="rId16"/>
   </p:notesMasterIdLst>
   <p:sldIdLst>
     <p:sldId id="256" r:id="rId2"/>
@@ -15,12 +15,13 @@
     <p:sldId id="265" r:id="rId6"/>
     <p:sldId id="266" r:id="rId7"/>
     <p:sldId id="269" r:id="rId8"/>
-    <p:sldId id="264" r:id="rId9"/>
-    <p:sldId id="261" r:id="rId10"/>
-    <p:sldId id="268" r:id="rId11"/>
-    <p:sldId id="263" r:id="rId12"/>
-    <p:sldId id="258" r:id="rId13"/>
-    <p:sldId id="259" r:id="rId14"/>
+    <p:sldId id="270" r:id="rId9"/>
+    <p:sldId id="264" r:id="rId10"/>
+    <p:sldId id="261" r:id="rId11"/>
+    <p:sldId id="268" r:id="rId12"/>
+    <p:sldId id="263" r:id="rId13"/>
+    <p:sldId id="258" r:id="rId14"/>
+    <p:sldId id="259" r:id="rId15"/>
   </p:sldIdLst>
   <p:sldSz cx="12192000" cy="6858000"/>
   <p:notesSz cx="6858000" cy="9144000"/>
@@ -220,7 +221,7 @@
           <a:p>
             <a:fld id="{90700FD8-EDD7-440D-B818-1D0CF60593B1}" type="datetimeFigureOut">
               <a:rPr lang="en-US" smtClean="0"/>
-              <a:t>9/11/2017</a:t>
+              <a:t>9/12/2017</a:t>
             </a:fld>
             <a:endParaRPr lang="en-US"/>
           </a:p>
@@ -618,11 +619,11 @@
           <a:p>
             <a:r>
               <a:rPr lang="en-US" dirty="0" smtClean="0"/>
-              <a:t>This</a:t>
+              <a:t>This slide shows the total funding by funding type.  As you can</a:t>
             </a:r>
             <a:r>
               <a:rPr lang="en-US" baseline="0" dirty="0" smtClean="0"/>
-              <a:t> slide may be a little hard to read, even though we made all the text bold and increase the size.  The numbers are in tens of millions, and go from Seed to Series D on the x-axis and from 0 to 50 million on the y-axis.  Again look at the Seed average which $600,000 and around 46 million for Series D.  So even though Series D had the smallest total funding, it has the largest average investment.  Why is this?  Are you able to draw conclusions yet?</a:t>
+              <a:t> see, Seed funding total is only 10% while in the previous slide it was 58% of the funding types.  Also, notice the percentages after Seed, starting with Series A to Series D get progressively smaller in terms of total funding.  Some of the conclusions take a little time to absorb.</a:t>
             </a:r>
             <a:endParaRPr lang="en-US" dirty="0"/>
           </a:p>
@@ -654,7 +655,7 @@
     </p:spTree>
     <p:extLst>
       <p:ext uri="{BB962C8B-B14F-4D97-AF65-F5344CB8AC3E}">
-        <p14:creationId xmlns:p14="http://schemas.microsoft.com/office/powerpoint/2010/main" val="1258652593"/>
+        <p14:creationId xmlns:p14="http://schemas.microsoft.com/office/powerpoint/2010/main" val="3190169614"/>
       </p:ext>
     </p:extLst>
   </p:cSld>
@@ -710,6 +711,98 @@
           <a:p>
             <a:r>
               <a:rPr lang="en-US" dirty="0" smtClean="0"/>
+              <a:t>This</a:t>
+            </a:r>
+            <a:r>
+              <a:rPr lang="en-US" baseline="0" dirty="0" smtClean="0"/>
+              <a:t> slide may be a little hard to read, even though we made all the text bold and increase the size.  The numbers are in tens of millions, and go from Seed to Series D on the x-axis and from 0 to 50 million on the y-axis.  Again look at the Seed average which $600,000 and around 46 million for Series D.  So even though Series D had the smallest total funding, it has the largest average investment.  Why is this?  Are you able to draw conclusions yet?</a:t>
+            </a:r>
+            <a:endParaRPr lang="en-US" dirty="0"/>
+          </a:p>
+        </p:txBody>
+      </p:sp>
+      <p:sp>
+        <p:nvSpPr>
+          <p:cNvPr id="4" name="Slide Number Placeholder 3"/>
+          <p:cNvSpPr>
+            <a:spLocks noGrp="1"/>
+          </p:cNvSpPr>
+          <p:nvPr>
+            <p:ph type="sldNum" sz="quarter" idx="10"/>
+          </p:nvPr>
+        </p:nvSpPr>
+        <p:spPr/>
+        <p:txBody>
+          <a:bodyPr/>
+          <a:lstStyle/>
+          <a:p>
+            <a:fld id="{31B36890-31D9-41D1-8CA9-93A001E873BD}" type="slidenum">
+              <a:rPr lang="en-US" smtClean="0"/>
+              <a:t>11</a:t>
+            </a:fld>
+            <a:endParaRPr lang="en-US"/>
+          </a:p>
+        </p:txBody>
+      </p:sp>
+    </p:spTree>
+    <p:extLst>
+      <p:ext uri="{BB962C8B-B14F-4D97-AF65-F5344CB8AC3E}">
+        <p14:creationId xmlns:p14="http://schemas.microsoft.com/office/powerpoint/2010/main" val="1258652593"/>
+      </p:ext>
+    </p:extLst>
+  </p:cSld>
+  <p:clrMapOvr>
+    <a:masterClrMapping/>
+  </p:clrMapOvr>
+</p:notes>
+</file>
+
+<file path=ppt/notesSlides/notesSlide12.xml><?xml version="1.0" encoding="utf-8"?>
+<p:notes xmlns:a="http://schemas.openxmlformats.org/drawingml/2006/main" xmlns:r="http://schemas.openxmlformats.org/officeDocument/2006/relationships" xmlns:p="http://schemas.openxmlformats.org/presentationml/2006/main">
+  <p:cSld>
+    <p:spTree>
+      <p:nvGrpSpPr>
+        <p:cNvPr id="1" name=""/>
+        <p:cNvGrpSpPr/>
+        <p:nvPr/>
+      </p:nvGrpSpPr>
+      <p:grpSpPr>
+        <a:xfrm>
+          <a:off x="0" y="0"/>
+          <a:ext cx="0" cy="0"/>
+          <a:chOff x="0" y="0"/>
+          <a:chExt cx="0" cy="0"/>
+        </a:xfrm>
+      </p:grpSpPr>
+      <p:sp>
+        <p:nvSpPr>
+          <p:cNvPr id="2" name="Slide Image Placeholder 1"/>
+          <p:cNvSpPr>
+            <a:spLocks noGrp="1" noRot="1" noChangeAspect="1"/>
+          </p:cNvSpPr>
+          <p:nvPr>
+            <p:ph type="sldImg"/>
+          </p:nvPr>
+        </p:nvSpPr>
+        <p:spPr/>
+      </p:sp>
+      <p:sp>
+        <p:nvSpPr>
+          <p:cNvPr id="3" name="Notes Placeholder 2"/>
+          <p:cNvSpPr>
+            <a:spLocks noGrp="1"/>
+          </p:cNvSpPr>
+          <p:nvPr>
+            <p:ph type="body" idx="1"/>
+          </p:nvPr>
+        </p:nvSpPr>
+        <p:spPr/>
+        <p:txBody>
+          <a:bodyPr/>
+          <a:lstStyle/>
+          <a:p>
+            <a:r>
+              <a:rPr lang="en-US" dirty="0" smtClean="0"/>
               <a:t>This project was a lesson in</a:t>
             </a:r>
             <a:r>
@@ -737,7 +830,7 @@
           <a:p>
             <a:fld id="{31B36890-31D9-41D1-8CA9-93A001E873BD}" type="slidenum">
               <a:rPr lang="en-US" smtClean="0"/>
-              <a:t>11</a:t>
+              <a:t>12</a:t>
             </a:fld>
             <a:endParaRPr lang="en-US"/>
           </a:p>
@@ -1174,15 +1267,7 @@
             </a:r>
             <a:r>
               <a:rPr lang="en-US" baseline="0" dirty="0" smtClean="0"/>
-              <a:t> than anticipated because the original data had the wrong URL for screen scraping.  In addition, not understanding the data led to a </a:t>
-            </a:r>
-            <a:r>
-              <a:rPr lang="en-US" baseline="0" dirty="0" smtClean="0"/>
-              <a:t>time consuming process</a:t>
-            </a:r>
-            <a:r>
-              <a:rPr lang="en-US" baseline="0" dirty="0" smtClean="0"/>
-              <a:t> to retrieve URLs.  Now, that the data is cleansed and better understood, the URLs are available without having to jump through hoops to get them.</a:t>
+              <a:t> than anticipated because the original data had the wrong URL for screen scraping.  In addition, not understanding the data led to a time consuming process to retrieve URLs.  Now, that the data is cleansed and better understood, the URLs are available without having to jump through hoops to get them.</a:t>
             </a:r>
             <a:endParaRPr lang="en-US" dirty="0"/>
           </a:p>
@@ -1362,12 +1447,57 @@
           <a:p>
             <a:r>
               <a:rPr lang="en-US" dirty="0" smtClean="0"/>
-              <a:t>This</a:t>
+              <a:t>Our focus</a:t>
             </a:r>
             <a:r>
               <a:rPr lang="en-US" baseline="0" dirty="0" smtClean="0"/>
-              <a:t> slide shows that the largest funding type is seed followed by Series A thru D.  Seed funding is the starting funding while companies move thru Series A to Series D based on their success at fund raising but also hopefully on their actual and potential eventual success as a company.  Coming slides will put this slide into better context.</a:t>
-            </a:r>
+              <a:t> – </a:t>
+            </a:r>
+            <a:r>
+              <a:rPr lang="en-US" dirty="0" smtClean="0"/>
+              <a:t>Funding Types</a:t>
+            </a:r>
+            <a:r>
+              <a:rPr lang="en-US" baseline="0" dirty="0" smtClean="0"/>
+              <a:t> and Status tables. </a:t>
+            </a:r>
+          </a:p>
+          <a:p>
+            <a:r>
+              <a:rPr lang="en-US" baseline="0" dirty="0" smtClean="0"/>
+              <a:t>Minimum Founded Date ‘2012-01-01’.</a:t>
+            </a:r>
+          </a:p>
+          <a:p>
+            <a:r>
+              <a:rPr lang="en-US" baseline="0" dirty="0" smtClean="0"/>
+              <a:t>Maximum Closed Date ‘2017-08-26’.</a:t>
+            </a:r>
+          </a:p>
+          <a:p>
+            <a:pPr marL="0" marR="0" lvl="0" indent="0" algn="l" defTabSz="914400" rtl="0" eaLnBrk="1" fontAlgn="auto" latinLnBrk="0" hangingPunct="1">
+              <a:lnSpc>
+                <a:spcPct val="100000"/>
+              </a:lnSpc>
+              <a:spcBef>
+                <a:spcPts val="0"/>
+              </a:spcBef>
+              <a:spcAft>
+                <a:spcPts val="0"/>
+              </a:spcAft>
+              <a:buClrTx/>
+              <a:buSzTx/>
+              <a:buFontTx/>
+              <a:buNone/>
+              <a:tabLst/>
+              <a:defRPr/>
+            </a:pPr>
+            <a:r>
+              <a:rPr lang="en-US" baseline="0" dirty="0" smtClean="0"/>
+              <a:t>We could have broken down status within each funding type, but we are focusing on Startup moving through funding phases and those that closed versus still operating.</a:t>
+            </a:r>
+          </a:p>
+          <a:p>
             <a:endParaRPr lang="en-US" dirty="0"/>
           </a:p>
         </p:txBody>
@@ -1398,7 +1528,7 @@
     </p:spTree>
     <p:extLst>
       <p:ext uri="{BB962C8B-B14F-4D97-AF65-F5344CB8AC3E}">
-        <p14:creationId xmlns:p14="http://schemas.microsoft.com/office/powerpoint/2010/main" val="1615266692"/>
+        <p14:creationId xmlns:p14="http://schemas.microsoft.com/office/powerpoint/2010/main" val="434930097"/>
       </p:ext>
     </p:extLst>
   </p:cSld>
@@ -1454,11 +1584,11 @@
           <a:p>
             <a:r>
               <a:rPr lang="en-US" dirty="0" smtClean="0"/>
-              <a:t>This slide shows the total funding by funding type.  As you can</a:t>
+              <a:t>This</a:t>
             </a:r>
             <a:r>
               <a:rPr lang="en-US" baseline="0" dirty="0" smtClean="0"/>
-              <a:t> see, Seed funding total is only 10% while in the previous slide it was 58% of the funding types.  Also, notice the percentages after Seed, starting with Series A to Series D get progressively smaller in terms of total funding.  Some of the conclusions take a little time to absorb.</a:t>
+              <a:t> slide shows that the largest funding type is seed followed by Series A thru D.  Seed funding is the starting funding while companies move thru Series A to Series D based on their success at fund raising but also hopefully on their actual and potential eventual success as a company.  Coming slides will put this slide into better context.</a:t>
             </a:r>
             <a:endParaRPr lang="en-US" dirty="0"/>
           </a:p>
@@ -1490,7 +1620,7 @@
     </p:spTree>
     <p:extLst>
       <p:ext uri="{BB962C8B-B14F-4D97-AF65-F5344CB8AC3E}">
-        <p14:creationId xmlns:p14="http://schemas.microsoft.com/office/powerpoint/2010/main" val="3190169614"/>
+        <p14:creationId xmlns:p14="http://schemas.microsoft.com/office/powerpoint/2010/main" val="1615266692"/>
       </p:ext>
     </p:extLst>
   </p:cSld>
@@ -1672,7 +1802,7 @@
             <a:fld id="{48A87A34-81AB-432B-8DAE-1953F412C126}" type="datetimeFigureOut">
               <a:rPr lang="en-US" smtClean="0"/>
               <a:pPr/>
-              <a:t>9/11/2017</a:t>
+              <a:t>9/12/2017</a:t>
             </a:fld>
             <a:endParaRPr lang="en-US" dirty="0"/>
           </a:p>
@@ -1989,7 +2119,7 @@
             <a:fld id="{48A87A34-81AB-432B-8DAE-1953F412C126}" type="datetimeFigureOut">
               <a:rPr lang="en-US" smtClean="0"/>
               <a:pPr/>
-              <a:t>9/11/2017</a:t>
+              <a:t>9/12/2017</a:t>
             </a:fld>
             <a:endParaRPr lang="en-US" dirty="0"/>
           </a:p>
@@ -2213,7 +2343,7 @@
             <a:fld id="{48A87A34-81AB-432B-8DAE-1953F412C126}" type="datetimeFigureOut">
               <a:rPr lang="en-US" smtClean="0"/>
               <a:pPr/>
-              <a:t>9/11/2017</a:t>
+              <a:t>9/12/2017</a:t>
             </a:fld>
             <a:endParaRPr lang="en-US" dirty="0"/>
           </a:p>
@@ -2506,7 +2636,7 @@
             <a:fld id="{48A87A34-81AB-432B-8DAE-1953F412C126}" type="datetimeFigureOut">
               <a:rPr lang="en-US" smtClean="0"/>
               <a:pPr/>
-              <a:t>9/11/2017</a:t>
+              <a:t>9/12/2017</a:t>
             </a:fld>
             <a:endParaRPr lang="en-US" dirty="0"/>
           </a:p>
@@ -2962,7 +3092,7 @@
             <a:fld id="{48A87A34-81AB-432B-8DAE-1953F412C126}" type="datetimeFigureOut">
               <a:rPr lang="en-US" smtClean="0"/>
               <a:pPr/>
-              <a:t>9/11/2017</a:t>
+              <a:t>9/12/2017</a:t>
             </a:fld>
             <a:endParaRPr lang="en-US" dirty="0"/>
           </a:p>
@@ -3540,7 +3670,7 @@
             <a:fld id="{48A87A34-81AB-432B-8DAE-1953F412C126}" type="datetimeFigureOut">
               <a:rPr lang="en-US" smtClean="0"/>
               <a:pPr/>
-              <a:t>9/11/2017</a:t>
+              <a:t>9/12/2017</a:t>
             </a:fld>
             <a:endParaRPr lang="en-US" dirty="0"/>
           </a:p>
@@ -4403,7 +4533,7 @@
             <a:fld id="{48A87A34-81AB-432B-8DAE-1953F412C126}" type="datetimeFigureOut">
               <a:rPr lang="en-US" smtClean="0"/>
               <a:pPr/>
-              <a:t>9/11/2017</a:t>
+              <a:t>9/12/2017</a:t>
             </a:fld>
             <a:endParaRPr lang="en-US" dirty="0"/>
           </a:p>
@@ -4610,7 +4740,7 @@
             <a:fld id="{48A87A34-81AB-432B-8DAE-1953F412C126}" type="datetimeFigureOut">
               <a:rPr lang="en-US" smtClean="0"/>
               <a:pPr/>
-              <a:t>9/11/2017</a:t>
+              <a:t>9/12/2017</a:t>
             </a:fld>
             <a:endParaRPr lang="en-US" dirty="0"/>
           </a:p>
@@ -4826,7 +4956,7 @@
             <a:fld id="{48A87A34-81AB-432B-8DAE-1953F412C126}" type="datetimeFigureOut">
               <a:rPr lang="en-US" smtClean="0"/>
               <a:pPr/>
-              <a:t>9/11/2017</a:t>
+              <a:t>9/12/2017</a:t>
             </a:fld>
             <a:endParaRPr lang="en-US" dirty="0"/>
           </a:p>
@@ -5033,7 +5163,7 @@
             <a:fld id="{48A87A34-81AB-432B-8DAE-1953F412C126}" type="datetimeFigureOut">
               <a:rPr lang="en-US" smtClean="0"/>
               <a:pPr/>
-              <a:t>9/11/2017</a:t>
+              <a:t>9/12/2017</a:t>
             </a:fld>
             <a:endParaRPr lang="en-US" dirty="0"/>
           </a:p>
@@ -5315,7 +5445,7 @@
             <a:fld id="{48A87A34-81AB-432B-8DAE-1953F412C126}" type="datetimeFigureOut">
               <a:rPr lang="en-US" smtClean="0"/>
               <a:pPr/>
-              <a:t>9/11/2017</a:t>
+              <a:t>9/12/2017</a:t>
             </a:fld>
             <a:endParaRPr lang="en-US" dirty="0"/>
           </a:p>
@@ -5584,7 +5714,7 @@
             <a:fld id="{48A87A34-81AB-432B-8DAE-1953F412C126}" type="datetimeFigureOut">
               <a:rPr lang="en-US" smtClean="0"/>
               <a:pPr/>
-              <a:t>9/11/2017</a:t>
+              <a:t>9/12/2017</a:t>
             </a:fld>
             <a:endParaRPr lang="en-US" dirty="0"/>
           </a:p>
@@ -6001,7 +6131,7 @@
             <a:fld id="{48A87A34-81AB-432B-8DAE-1953F412C126}" type="datetimeFigureOut">
               <a:rPr lang="en-US" smtClean="0"/>
               <a:pPr/>
-              <a:t>9/11/2017</a:t>
+              <a:t>9/12/2017</a:t>
             </a:fld>
             <a:endParaRPr lang="en-US" dirty="0"/>
           </a:p>
@@ -6151,7 +6281,7 @@
             <a:fld id="{48A87A34-81AB-432B-8DAE-1953F412C126}" type="datetimeFigureOut">
               <a:rPr lang="en-US" smtClean="0"/>
               <a:pPr/>
-              <a:t>9/11/2017</a:t>
+              <a:t>9/12/2017</a:t>
             </a:fld>
             <a:endParaRPr lang="en-US" dirty="0"/>
           </a:p>
@@ -6278,7 +6408,7 @@
             <a:fld id="{48A87A34-81AB-432B-8DAE-1953F412C126}" type="datetimeFigureOut">
               <a:rPr lang="en-US" smtClean="0"/>
               <a:pPr/>
-              <a:t>9/11/2017</a:t>
+              <a:t>9/12/2017</a:t>
             </a:fld>
             <a:endParaRPr lang="en-US" dirty="0"/>
           </a:p>
@@ -6559,7 +6689,7 @@
             <a:fld id="{48A87A34-81AB-432B-8DAE-1953F412C126}" type="datetimeFigureOut">
               <a:rPr lang="en-US" smtClean="0"/>
               <a:pPr/>
-              <a:t>9/11/2017</a:t>
+              <a:t>9/12/2017</a:t>
             </a:fld>
             <a:endParaRPr lang="en-US" dirty="0"/>
           </a:p>
@@ -6876,7 +7006,7 @@
             <a:fld id="{48A87A34-81AB-432B-8DAE-1953F412C126}" type="datetimeFigureOut">
               <a:rPr lang="en-US" smtClean="0"/>
               <a:pPr/>
-              <a:t>9/11/2017</a:t>
+              <a:t>9/12/2017</a:t>
             </a:fld>
             <a:endParaRPr lang="en-US" dirty="0"/>
           </a:p>
@@ -7131,7 +7261,7 @@
             <a:fld id="{48A87A34-81AB-432B-8DAE-1953F412C126}" type="datetimeFigureOut">
               <a:rPr lang="en-US" smtClean="0"/>
               <a:pPr/>
-              <a:t>9/11/2017</a:t>
+              <a:t>9/12/2017</a:t>
             </a:fld>
             <a:endParaRPr lang="en-US" dirty="0"/>
           </a:p>
@@ -7621,11 +7751,7 @@
           <a:p>
             <a:r>
               <a:rPr lang="en-US" dirty="0" smtClean="0"/>
-              <a:t>Project </a:t>
-            </a:r>
-            <a:r>
-              <a:rPr lang="en-US" dirty="0" smtClean="0"/>
-              <a:t>-1 Startups</a:t>
+              <a:t>Project -1 Startups</a:t>
             </a:r>
             <a:endParaRPr lang="en-US" dirty="0"/>
           </a:p>
@@ -7652,6 +7778,103 @@
 </file>
 
 <file path=ppt/slides/slide10.xml><?xml version="1.0" encoding="utf-8"?>
+<p:sld xmlns:a="http://schemas.openxmlformats.org/drawingml/2006/main" xmlns:r="http://schemas.openxmlformats.org/officeDocument/2006/relationships" xmlns:p="http://schemas.openxmlformats.org/presentationml/2006/main">
+  <p:cSld>
+    <p:spTree>
+      <p:nvGrpSpPr>
+        <p:cNvPr id="1" name=""/>
+        <p:cNvGrpSpPr/>
+        <p:nvPr/>
+      </p:nvGrpSpPr>
+      <p:grpSpPr>
+        <a:xfrm>
+          <a:off x="0" y="0"/>
+          <a:ext cx="0" cy="0"/>
+          <a:chOff x="0" y="0"/>
+          <a:chExt cx="0" cy="0"/>
+        </a:xfrm>
+      </p:grpSpPr>
+      <p:sp>
+        <p:nvSpPr>
+          <p:cNvPr id="2" name="Title 1"/>
+          <p:cNvSpPr>
+            <a:spLocks noGrp="1"/>
+          </p:cNvSpPr>
+          <p:nvPr>
+            <p:ph type="title"/>
+          </p:nvPr>
+        </p:nvSpPr>
+        <p:spPr/>
+        <p:txBody>
+          <a:bodyPr/>
+          <a:lstStyle/>
+          <a:p>
+            <a:r>
+              <a:rPr lang="en-US" dirty="0" smtClean="0"/>
+              <a:t>Funding </a:t>
+            </a:r>
+            <a:r>
+              <a:rPr lang="en-US" dirty="0"/>
+              <a:t>type </a:t>
+            </a:r>
+            <a:r>
+              <a:rPr lang="en-US" dirty="0" smtClean="0"/>
+              <a:t>Total Funding Percentages </a:t>
+            </a:r>
+            <a:endParaRPr lang="en-US" dirty="0"/>
+          </a:p>
+        </p:txBody>
+      </p:sp>
+      <p:pic>
+        <p:nvPicPr>
+          <p:cNvPr id="6" name="Content Placeholder 5"/>
+          <p:cNvPicPr>
+            <a:picLocks noGrp="1" noChangeAspect="1"/>
+          </p:cNvPicPr>
+          <p:nvPr>
+            <p:ph sz="quarter" idx="13"/>
+          </p:nvPr>
+        </p:nvPicPr>
+        <p:blipFill>
+          <a:blip r:embed="rId3">
+            <a:extLst>
+              <a:ext uri="{28A0092B-C50C-407E-A947-70E740481C1C}">
+                <a14:useLocalDpi xmlns:a14="http://schemas.microsoft.com/office/drawing/2010/main" val="0"/>
+              </a:ext>
+            </a:extLst>
+          </a:blip>
+          <a:stretch>
+            <a:fillRect/>
+          </a:stretch>
+        </p:blipFill>
+        <p:spPr>
+          <a:xfrm>
+            <a:off x="3383973" y="2214694"/>
+            <a:ext cx="5424053" cy="3812032"/>
+          </a:xfrm>
+        </p:spPr>
+      </p:pic>
+    </p:spTree>
+    <p:extLst>
+      <p:ext uri="{BB962C8B-B14F-4D97-AF65-F5344CB8AC3E}">
+        <p14:creationId xmlns:p14="http://schemas.microsoft.com/office/powerpoint/2010/main" val="3584956998"/>
+      </p:ext>
+    </p:extLst>
+  </p:cSld>
+  <p:clrMapOvr>
+    <a:masterClrMapping/>
+  </p:clrMapOvr>
+  <p:timing>
+    <p:tnLst>
+      <p:par>
+        <p:cTn id="1" dur="indefinite" restart="never" nodeType="tmRoot"/>
+      </p:par>
+    </p:tnLst>
+  </p:timing>
+</p:sld>
+</file>
+
+<file path=ppt/slides/slide11.xml><?xml version="1.0" encoding="utf-8"?>
 <p:sld xmlns:a="http://schemas.openxmlformats.org/drawingml/2006/main" xmlns:r="http://schemas.openxmlformats.org/officeDocument/2006/relationships" xmlns:p="http://schemas.openxmlformats.org/presentationml/2006/main">
   <p:cSld>
     <p:spTree>
@@ -7739,7 +7962,7 @@
 </p:sld>
 </file>
 
-<file path=ppt/slides/slide11.xml><?xml version="1.0" encoding="utf-8"?>
+<file path=ppt/slides/slide12.xml><?xml version="1.0" encoding="utf-8"?>
 <p:sld xmlns:a="http://schemas.openxmlformats.org/drawingml/2006/main" xmlns:r="http://schemas.openxmlformats.org/officeDocument/2006/relationships" xmlns:p="http://schemas.openxmlformats.org/presentationml/2006/main">
   <p:cSld>
     <p:spTree>
@@ -7841,23 +8064,13 @@
               <a:rPr lang="en-US" dirty="0" smtClean="0"/>
               <a:t>brainstorming session for story, questions, and data</a:t>
             </a:r>
-            <a:endParaRPr lang="en-US" dirty="0" smtClean="0"/>
           </a:p>
           <a:p>
             <a:pPr lvl="2"/>
             <a:r>
               <a:rPr lang="en-US" dirty="0" smtClean="0"/>
-              <a:t>No development of </a:t>
-            </a:r>
-            <a:r>
-              <a:rPr lang="en-US" dirty="0" smtClean="0"/>
-              <a:t>ideas </a:t>
-            </a:r>
-            <a:r>
-              <a:rPr lang="en-US" dirty="0" smtClean="0"/>
-              <a:t>or documentation beyond the initial session</a:t>
-            </a:r>
-            <a:endParaRPr lang="en-US" dirty="0" smtClean="0"/>
+              <a:t>No development of ideas or documentation beyond the initial session</a:t>
+            </a:r>
           </a:p>
           <a:p>
             <a:pPr lvl="2"/>
@@ -7887,7 +8100,6 @@
               <a:rPr lang="en-US" dirty="0" smtClean="0"/>
               <a:t>Met in Class - no other working or planning meetings</a:t>
             </a:r>
-            <a:endParaRPr lang="en-US" dirty="0" smtClean="0"/>
           </a:p>
           <a:p>
             <a:r>
@@ -7901,7 +8113,6 @@
               <a:rPr lang="en-US" dirty="0" smtClean="0"/>
               <a:t>Used Google drive to share file</a:t>
             </a:r>
-            <a:endParaRPr lang="en-US" dirty="0" smtClean="0"/>
           </a:p>
           <a:p>
             <a:endParaRPr lang="en-US" dirty="0"/>
@@ -7928,7 +8139,7 @@
 </p:sld>
 </file>
 
-<file path=ppt/slides/slide12.xml><?xml version="1.0" encoding="utf-8"?>
+<file path=ppt/slides/slide13.xml><?xml version="1.0" encoding="utf-8"?>
 <p:sld xmlns:a="http://schemas.openxmlformats.org/drawingml/2006/main" xmlns:r="http://schemas.openxmlformats.org/officeDocument/2006/relationships" xmlns:p="http://schemas.openxmlformats.org/presentationml/2006/main">
   <p:cSld>
     <p:spTree>
@@ -8017,7 +8228,7 @@
 </p:sld>
 </file>
 
-<file path=ppt/slides/slide13.xml><?xml version="1.0" encoding="utf-8"?>
+<file path=ppt/slides/slide14.xml><?xml version="1.0" encoding="utf-8"?>
 <p:sld xmlns:a="http://schemas.openxmlformats.org/drawingml/2006/main" xmlns:r="http://schemas.openxmlformats.org/officeDocument/2006/relationships" xmlns:p="http://schemas.openxmlformats.org/presentationml/2006/main">
   <p:cSld>
     <p:spTree>
@@ -8074,21 +8285,8 @@
           <a:p>
             <a:r>
               <a:rPr lang="en-US" dirty="0" smtClean="0"/>
-              <a:t>Rachel had the </a:t>
-            </a:r>
-            <a:r>
-              <a:rPr lang="en-US" dirty="0" smtClean="0"/>
-              <a:t>Startups idea (when </a:t>
-            </a:r>
-            <a:r>
-              <a:rPr lang="en-US" dirty="0" smtClean="0"/>
-              <a:t>we needed </a:t>
-            </a:r>
-            <a:r>
-              <a:rPr lang="en-US" dirty="0" smtClean="0"/>
-              <a:t>one)</a:t>
-            </a:r>
-            <a:endParaRPr lang="en-US" dirty="0" smtClean="0"/>
+              <a:t>Rachel had the Startups idea (when we needed one)</a:t>
+            </a:r>
           </a:p>
           <a:p>
             <a:r>
@@ -8123,15 +8321,7 @@
             </a:r>
             <a:r>
               <a:rPr lang="en-US" dirty="0" smtClean="0"/>
-              <a:t> – </a:t>
-            </a:r>
-            <a:r>
-              <a:rPr lang="en-US" dirty="0" smtClean="0"/>
-              <a:t>search engine </a:t>
-            </a:r>
-            <a:r>
-              <a:rPr lang="en-US" dirty="0" smtClean="0"/>
-              <a:t>and file storage/sharing</a:t>
+              <a:t> – search engine and file storage/sharing</a:t>
             </a:r>
           </a:p>
           <a:p>
@@ -8653,11 +8843,7 @@
           <a:p>
             <a:r>
               <a:rPr lang="en-US" dirty="0" smtClean="0"/>
-              <a:t>Our Project </a:t>
-            </a:r>
-            <a:r>
-              <a:rPr lang="en-US" dirty="0" smtClean="0"/>
-              <a:t>–Startups</a:t>
+              <a:t>Our Project –Startups</a:t>
             </a:r>
             <a:endParaRPr lang="en-US" dirty="0"/>
           </a:p>
@@ -8806,11 +8992,7 @@
             </a:r>
             <a:r>
               <a:rPr lang="en-US" dirty="0" smtClean="0"/>
-              <a:t>Gathering – </a:t>
-            </a:r>
-            <a:r>
-              <a:rPr lang="en-US" dirty="0" smtClean="0"/>
-              <a:t>User interface ($)</a:t>
+              <a:t>Gathering – User interface ($)</a:t>
             </a:r>
             <a:endParaRPr lang="en-US" dirty="0"/>
           </a:p>
@@ -8846,15 +9028,7 @@
           <a:p>
             <a:r>
               <a:rPr lang="en-US" dirty="0" smtClean="0"/>
-              <a:t>Graphical </a:t>
-            </a:r>
-            <a:r>
-              <a:rPr lang="en-US" dirty="0" smtClean="0"/>
-              <a:t>user interface to </a:t>
-            </a:r>
-            <a:r>
-              <a:rPr lang="en-US" dirty="0" smtClean="0"/>
-              <a:t>search and build queries </a:t>
+              <a:t>Graphical user interface to search and build queries </a:t>
             </a:r>
             <a:r>
               <a:rPr lang="en-US" dirty="0"/>
@@ -8865,13 +9039,8 @@
           <a:p>
             <a:r>
               <a:rPr lang="en-US" dirty="0" smtClean="0"/>
-              <a:t>Downloaded batches of 1000 records as </a:t>
-            </a:r>
-            <a:r>
-              <a:rPr lang="en-US" dirty="0" smtClean="0"/>
-              <a:t>csv files</a:t>
-            </a:r>
-            <a:endParaRPr lang="en-US" dirty="0" smtClean="0"/>
+              <a:t>Downloaded batches of 1000 records as csv files</a:t>
+            </a:r>
           </a:p>
           <a:p>
             <a:pPr lvl="1"/>
@@ -8998,7 +9167,6 @@
               <a:rPr lang="en-US" dirty="0" smtClean="0"/>
               <a:t>Free api was limited but we learned how to extract api data</a:t>
             </a:r>
-            <a:endParaRPr lang="en-US" dirty="0" smtClean="0"/>
           </a:p>
           <a:p>
             <a:pPr marL="228600" lvl="1">
@@ -9008,11 +9176,7 @@
             </a:pPr>
             <a:r>
               <a:rPr lang="en-US" dirty="0" smtClean="0"/>
-              <a:t>print</a:t>
-            </a:r>
-            <a:r>
-              <a:rPr lang="en-US" dirty="0" smtClean="0"/>
-              <a:t>("The Crunchbase API responded with: " + json.dumps(org_json, indent=2) + ".")</a:t>
+              <a:t>print("The Crunchbase API responded with: " + json.dumps(org_json, indent=2) + ".")</a:t>
             </a:r>
           </a:p>
           <a:p>
@@ -9023,17 +9187,8 @@
             </a:pPr>
             <a:r>
               <a:rPr lang="en-US" dirty="0" smtClean="0"/>
-              <a:t>Created org_df </a:t>
-            </a:r>
-            <a:r>
-              <a:rPr lang="en-US" dirty="0" smtClean="0"/>
-              <a:t>= pd.DataFrame() </a:t>
-            </a:r>
-            <a:r>
-              <a:rPr lang="en-US" dirty="0" smtClean="0"/>
-              <a:t>with empty columns</a:t>
-            </a:r>
-            <a:endParaRPr lang="en-US" dirty="0" smtClean="0"/>
+              <a:t>Created org_df = pd.DataFrame() with empty columns</a:t>
+            </a:r>
           </a:p>
           <a:p>
             <a:pPr marL="685800" lvl="2">
@@ -9043,11 +9198,7 @@
             </a:pPr>
             <a:r>
               <a:rPr lang="en-US" dirty="0" smtClean="0"/>
-              <a:t>oname  </a:t>
-            </a:r>
-            <a:r>
-              <a:rPr lang="en-US" dirty="0" smtClean="0"/>
-              <a:t>= org_json["data"]["items"][i]["properties"]["name"]</a:t>
+              <a:t>oname  = org_json["data"]["items"][i]["properties"]["name"]</a:t>
             </a:r>
           </a:p>
           <a:p>
@@ -9069,17 +9220,8 @@
             </a:pPr>
             <a:r>
               <a:rPr lang="en-US" dirty="0" smtClean="0"/>
-              <a:t>Even with paid license we couldn’t access </a:t>
-            </a:r>
-            <a:r>
-              <a:rPr lang="en-US" dirty="0" smtClean="0"/>
-              <a:t>all json </a:t>
-            </a:r>
-            <a:r>
-              <a:rPr lang="en-US" dirty="0" smtClean="0"/>
-              <a:t>structures</a:t>
-            </a:r>
-            <a:endParaRPr lang="en-US" dirty="0" smtClean="0"/>
+              <a:t>Even with paid license we couldn’t access all json structures</a:t>
+            </a:r>
           </a:p>
           <a:p>
             <a:pPr marL="685800" lvl="2">
@@ -9185,7 +9327,6 @@
               <a:rPr lang="en-US" dirty="0" smtClean="0"/>
               <a:t>time.sleep(45)</a:t>
             </a:r>
-            <a:endParaRPr lang="en-US" dirty="0" smtClean="0"/>
           </a:p>
           <a:p>
             <a:r>
@@ -9196,13 +9337,8 @@
           <a:p>
             <a:r>
               <a:rPr lang="en-US" dirty="0" smtClean="0"/>
-              <a:t> Print(soup.prettify</a:t>
-            </a:r>
-            <a:r>
-              <a:rPr lang="en-US" dirty="0" smtClean="0"/>
-              <a:t>()) – to read json structure</a:t>
-            </a:r>
-            <a:endParaRPr lang="en-US" dirty="0" smtClean="0"/>
+              <a:t> Print(soup.prettify()) – to read json structure</a:t>
+            </a:r>
           </a:p>
           <a:p>
             <a:r>
@@ -9213,11 +9349,7 @@
           <a:p>
             <a:r>
               <a:rPr lang="en-US" dirty="0" smtClean="0"/>
-              <a:t>org2_df.set_value(index, "Total Visits", line.get_Text</a:t>
-            </a:r>
-            <a:r>
-              <a:rPr lang="en-US" dirty="0" smtClean="0"/>
-              <a:t>())</a:t>
+              <a:t>org2_df.set_value(index, "Total Visits", line.get_Text())</a:t>
             </a:r>
           </a:p>
           <a:p>
@@ -9225,7 +9357,6 @@
               <a:rPr lang="en-US" dirty="0" smtClean="0"/>
               <a:t>This method required a lot of work</a:t>
             </a:r>
-            <a:endParaRPr lang="en-US" dirty="0" smtClean="0"/>
           </a:p>
           <a:p>
             <a:pPr lvl="1">
@@ -9395,49 +9526,411 @@
           <a:p>
             <a:r>
               <a:rPr lang="en-US" dirty="0" smtClean="0"/>
-              <a:t>Funding Type </a:t>
-            </a:r>
-            <a:r>
-              <a:rPr lang="en-US" dirty="0" smtClean="0"/>
-              <a:t>by percentage</a:t>
-            </a:r>
-            <a:endParaRPr lang="en-US" dirty="0"/>
-          </a:p>
-        </p:txBody>
-      </p:sp>
-      <p:pic>
-        <p:nvPicPr>
-          <p:cNvPr id="7" name="Content Placeholder 6"/>
-          <p:cNvPicPr>
-            <a:picLocks noGrp="1" noChangeAspect="1"/>
-          </p:cNvPicPr>
+              <a:t>Funding Type and Status</a:t>
+            </a:r>
+            <a:endParaRPr lang="en-US" dirty="0"/>
+          </a:p>
+        </p:txBody>
+      </p:sp>
+      <p:graphicFrame>
+        <p:nvGraphicFramePr>
+          <p:cNvPr id="12" name="Content Placeholder 11"/>
+          <p:cNvGraphicFramePr>
+            <a:graphicFrameLocks noGrp="1"/>
+          </p:cNvGraphicFramePr>
           <p:nvPr>
             <p:ph sz="quarter" idx="13"/>
-          </p:nvPr>
-        </p:nvPicPr>
-        <p:blipFill>
-          <a:blip r:embed="rId3">
-            <a:extLst>
-              <a:ext uri="{28A0092B-C50C-407E-A947-70E740481C1C}">
-                <a14:useLocalDpi xmlns:a14="http://schemas.microsoft.com/office/drawing/2010/main" val="0"/>
-              </a:ext>
-            </a:extLst>
-          </a:blip>
-          <a:stretch>
-            <a:fillRect/>
-          </a:stretch>
-        </p:blipFill>
-        <p:spPr>
-          <a:xfrm>
-            <a:off x="3969327" y="2214695"/>
-            <a:ext cx="4384964" cy="3791250"/>
-          </a:xfrm>
-        </p:spPr>
-      </p:pic>
+            <p:extLst>
+              <p:ext uri="{D42A27DB-BD31-4B8C-83A1-F6EECF244321}">
+                <p14:modId xmlns:p14="http://schemas.microsoft.com/office/powerpoint/2010/main" val="1583988869"/>
+              </p:ext>
+            </p:extLst>
+          </p:nvPr>
+        </p:nvGraphicFramePr>
+        <p:xfrm>
+          <a:off x="6573329" y="2494065"/>
+          <a:ext cx="2915728" cy="2286000"/>
+        </p:xfrm>
+        <a:graphic>
+          <a:graphicData uri="http://schemas.openxmlformats.org/drawingml/2006/table">
+            <a:tbl>
+              <a:tblPr firstRow="1" bandRow="1">
+                <a:tableStyleId>{10A1B5D5-9B99-4C35-A422-299274C87663}</a:tableStyleId>
+              </a:tblPr>
+              <a:tblGrid>
+                <a:gridCol w="1464582"/>
+                <a:gridCol w="1451146"/>
+              </a:tblGrid>
+              <a:tr h="270648">
+                <a:tc>
+                  <a:txBody>
+                    <a:bodyPr/>
+                    <a:lstStyle/>
+                    <a:p>
+                      <a:r>
+                        <a:rPr lang="en-US" sz="2400" dirty="0" smtClean="0"/>
+                        <a:t>Status</a:t>
+                      </a:r>
+                      <a:endParaRPr lang="en-US" sz="2400" dirty="0"/>
+                    </a:p>
+                  </a:txBody>
+                  <a:tcPr/>
+                </a:tc>
+                <a:tc>
+                  <a:txBody>
+                    <a:bodyPr/>
+                    <a:lstStyle/>
+                    <a:p>
+                      <a:r>
+                        <a:rPr lang="en-US" sz="2400" dirty="0" smtClean="0"/>
+                        <a:t>Count</a:t>
+                      </a:r>
+                      <a:endParaRPr lang="en-US" sz="2400" dirty="0"/>
+                    </a:p>
+                  </a:txBody>
+                  <a:tcPr/>
+                </a:tc>
+              </a:tr>
+              <a:tr h="370840">
+                <a:tc>
+                  <a:txBody>
+                    <a:bodyPr/>
+                    <a:lstStyle/>
+                    <a:p>
+                      <a:r>
+                        <a:rPr lang="en-US" sz="2400" dirty="0" smtClean="0"/>
+                        <a:t>Operating</a:t>
+                      </a:r>
+                      <a:endParaRPr lang="en-US" sz="2400" dirty="0"/>
+                    </a:p>
+                  </a:txBody>
+                  <a:tcPr/>
+                </a:tc>
+                <a:tc>
+                  <a:txBody>
+                    <a:bodyPr/>
+                    <a:lstStyle/>
+                    <a:p>
+                      <a:r>
+                        <a:rPr lang="en-US" sz="2400" dirty="0" smtClean="0"/>
+                        <a:t>7982</a:t>
+                      </a:r>
+                      <a:endParaRPr lang="en-US" sz="2400" dirty="0"/>
+                    </a:p>
+                  </a:txBody>
+                  <a:tcPr/>
+                </a:tc>
+              </a:tr>
+              <a:tr h="370840">
+                <a:tc>
+                  <a:txBody>
+                    <a:bodyPr/>
+                    <a:lstStyle/>
+                    <a:p>
+                      <a:r>
+                        <a:rPr lang="en-US" sz="2400" dirty="0" smtClean="0"/>
+                        <a:t>Closed</a:t>
+                      </a:r>
+                      <a:endParaRPr lang="en-US" sz="2400" dirty="0"/>
+                    </a:p>
+                  </a:txBody>
+                  <a:tcPr/>
+                </a:tc>
+                <a:tc>
+                  <a:txBody>
+                    <a:bodyPr/>
+                    <a:lstStyle/>
+                    <a:p>
+                      <a:r>
+                        <a:rPr lang="en-US" sz="2400" dirty="0" smtClean="0"/>
+                        <a:t>232</a:t>
+                      </a:r>
+                      <a:endParaRPr lang="en-US" sz="2400" dirty="0"/>
+                    </a:p>
+                  </a:txBody>
+                  <a:tcPr/>
+                </a:tc>
+              </a:tr>
+              <a:tr h="370840">
+                <a:tc>
+                  <a:txBody>
+                    <a:bodyPr/>
+                    <a:lstStyle/>
+                    <a:p>
+                      <a:r>
+                        <a:rPr lang="en-US" sz="2400" dirty="0" smtClean="0"/>
+                        <a:t>Acquired</a:t>
+                      </a:r>
+                      <a:endParaRPr lang="en-US" sz="2400" dirty="0"/>
+                    </a:p>
+                  </a:txBody>
+                  <a:tcPr/>
+                </a:tc>
+                <a:tc>
+                  <a:txBody>
+                    <a:bodyPr/>
+                    <a:lstStyle/>
+                    <a:p>
+                      <a:r>
+                        <a:rPr lang="en-US" sz="2400" dirty="0" smtClean="0"/>
+                        <a:t>548</a:t>
+                      </a:r>
+                      <a:endParaRPr lang="en-US" sz="2400" dirty="0"/>
+                    </a:p>
+                  </a:txBody>
+                  <a:tcPr/>
+                </a:tc>
+              </a:tr>
+              <a:tr h="370840">
+                <a:tc>
+                  <a:txBody>
+                    <a:bodyPr/>
+                    <a:lstStyle/>
+                    <a:p>
+                      <a:r>
+                        <a:rPr lang="en-US" sz="2400" dirty="0" smtClean="0"/>
+                        <a:t>IPO</a:t>
+                      </a:r>
+                      <a:endParaRPr lang="en-US" sz="2400" dirty="0"/>
+                    </a:p>
+                  </a:txBody>
+                  <a:tcPr/>
+                </a:tc>
+                <a:tc>
+                  <a:txBody>
+                    <a:bodyPr/>
+                    <a:lstStyle/>
+                    <a:p>
+                      <a:r>
+                        <a:rPr lang="en-US" sz="2400" dirty="0" smtClean="0"/>
+                        <a:t>36</a:t>
+                      </a:r>
+                      <a:endParaRPr lang="en-US" sz="2400" dirty="0"/>
+                    </a:p>
+                  </a:txBody>
+                  <a:tcPr/>
+                </a:tc>
+              </a:tr>
+            </a:tbl>
+          </a:graphicData>
+        </a:graphic>
+      </p:graphicFrame>
+      <p:graphicFrame>
+        <p:nvGraphicFramePr>
+          <p:cNvPr id="13" name="Table 12"/>
+          <p:cNvGraphicFramePr>
+            <a:graphicFrameLocks noGrp="1"/>
+          </p:cNvGraphicFramePr>
+          <p:nvPr>
+            <p:extLst>
+              <p:ext uri="{D42A27DB-BD31-4B8C-83A1-F6EECF244321}">
+                <p14:modId xmlns:p14="http://schemas.microsoft.com/office/powerpoint/2010/main" val="274847438"/>
+              </p:ext>
+            </p:extLst>
+          </p:nvPr>
+        </p:nvGraphicFramePr>
+        <p:xfrm>
+          <a:off x="1725282" y="2494065"/>
+          <a:ext cx="4192438" cy="2743200"/>
+        </p:xfrm>
+        <a:graphic>
+          <a:graphicData uri="http://schemas.openxmlformats.org/drawingml/2006/table">
+            <a:tbl>
+              <a:tblPr firstRow="1" bandRow="1">
+                <a:tableStyleId>{10A1B5D5-9B99-4C35-A422-299274C87663}</a:tableStyleId>
+              </a:tblPr>
+              <a:tblGrid>
+                <a:gridCol w="2096219"/>
+                <a:gridCol w="2096219"/>
+              </a:tblGrid>
+              <a:tr h="352652">
+                <a:tc>
+                  <a:txBody>
+                    <a:bodyPr/>
+                    <a:lstStyle/>
+                    <a:p>
+                      <a:r>
+                        <a:rPr lang="en-US" sz="2400" dirty="0" smtClean="0"/>
+                        <a:t>Funding Type</a:t>
+                      </a:r>
+                      <a:endParaRPr lang="en-US" sz="2400" dirty="0"/>
+                    </a:p>
+                  </a:txBody>
+                  <a:tcPr/>
+                </a:tc>
+                <a:tc>
+                  <a:txBody>
+                    <a:bodyPr/>
+                    <a:lstStyle/>
+                    <a:p>
+                      <a:r>
+                        <a:rPr lang="en-US" sz="2400" dirty="0" smtClean="0"/>
+                        <a:t>Count</a:t>
+                      </a:r>
+                      <a:endParaRPr lang="en-US" sz="2400" dirty="0"/>
+                    </a:p>
+                  </a:txBody>
+                  <a:tcPr/>
+                </a:tc>
+              </a:tr>
+              <a:tr h="303972">
+                <a:tc>
+                  <a:txBody>
+                    <a:bodyPr/>
+                    <a:lstStyle/>
+                    <a:p>
+                      <a:r>
+                        <a:rPr lang="en-US" sz="2400" dirty="0" smtClean="0"/>
+                        <a:t>Seed</a:t>
+                      </a:r>
+                      <a:endParaRPr lang="en-US" sz="2400" dirty="0"/>
+                    </a:p>
+                  </a:txBody>
+                  <a:tcPr/>
+                </a:tc>
+                <a:tc>
+                  <a:txBody>
+                    <a:bodyPr/>
+                    <a:lstStyle/>
+                    <a:p>
+                      <a:r>
+                        <a:rPr lang="en-US" sz="2400" dirty="0" smtClean="0"/>
+                        <a:t>5174</a:t>
+                      </a:r>
+                      <a:endParaRPr lang="en-US" sz="2400" dirty="0"/>
+                    </a:p>
+                  </a:txBody>
+                  <a:tcPr/>
+                </a:tc>
+              </a:tr>
+              <a:tr h="303972">
+                <a:tc>
+                  <a:txBody>
+                    <a:bodyPr/>
+                    <a:lstStyle/>
+                    <a:p>
+                      <a:r>
+                        <a:rPr lang="en-US" sz="2400" dirty="0" smtClean="0"/>
+                        <a:t>Series A</a:t>
+                      </a:r>
+                      <a:endParaRPr lang="en-US" sz="2400" dirty="0"/>
+                    </a:p>
+                  </a:txBody>
+                  <a:tcPr/>
+                </a:tc>
+                <a:tc>
+                  <a:txBody>
+                    <a:bodyPr/>
+                    <a:lstStyle/>
+                    <a:p>
+                      <a:r>
+                        <a:rPr lang="en-US" sz="2400" dirty="0" smtClean="0"/>
+                        <a:t>2461</a:t>
+                      </a:r>
+                      <a:endParaRPr lang="en-US" sz="2400" dirty="0"/>
+                    </a:p>
+                  </a:txBody>
+                  <a:tcPr/>
+                </a:tc>
+              </a:tr>
+              <a:tr h="303972">
+                <a:tc>
+                  <a:txBody>
+                    <a:bodyPr/>
+                    <a:lstStyle/>
+                    <a:p>
+                      <a:r>
+                        <a:rPr lang="en-US" sz="2400" dirty="0" smtClean="0"/>
+                        <a:t>Series B</a:t>
+                      </a:r>
+                      <a:endParaRPr lang="en-US" sz="2400" dirty="0"/>
+                    </a:p>
+                  </a:txBody>
+                  <a:tcPr/>
+                </a:tc>
+                <a:tc>
+                  <a:txBody>
+                    <a:bodyPr/>
+                    <a:lstStyle/>
+                    <a:p>
+                      <a:r>
+                        <a:rPr lang="en-US" sz="2400" dirty="0" smtClean="0"/>
+                        <a:t>904</a:t>
+                      </a:r>
+                      <a:endParaRPr lang="en-US" sz="2400" dirty="0"/>
+                    </a:p>
+                  </a:txBody>
+                  <a:tcPr/>
+                </a:tc>
+              </a:tr>
+              <a:tr h="303972">
+                <a:tc>
+                  <a:txBody>
+                    <a:bodyPr/>
+                    <a:lstStyle/>
+                    <a:p>
+                      <a:r>
+                        <a:rPr lang="en-US" sz="2400" dirty="0" smtClean="0"/>
+                        <a:t>Series C</a:t>
+                      </a:r>
+                      <a:endParaRPr lang="en-US" sz="2400" dirty="0"/>
+                    </a:p>
+                  </a:txBody>
+                  <a:tcPr/>
+                </a:tc>
+                <a:tc>
+                  <a:txBody>
+                    <a:bodyPr/>
+                    <a:lstStyle/>
+                    <a:p>
+                      <a:r>
+                        <a:rPr lang="en-US" sz="2400" dirty="0" smtClean="0"/>
+                        <a:t>218</a:t>
+                      </a:r>
+                      <a:endParaRPr lang="en-US" sz="2400" dirty="0"/>
+                    </a:p>
+                  </a:txBody>
+                  <a:tcPr/>
+                </a:tc>
+              </a:tr>
+              <a:tr h="303972">
+                <a:tc>
+                  <a:txBody>
+                    <a:bodyPr/>
+                    <a:lstStyle/>
+                    <a:p>
+                      <a:r>
+                        <a:rPr lang="en-US" sz="2400" dirty="0" smtClean="0"/>
+                        <a:t>Series D</a:t>
+                      </a:r>
+                      <a:endParaRPr lang="en-US" sz="2400" dirty="0"/>
+                    </a:p>
+                  </a:txBody>
+                  <a:tcPr/>
+                </a:tc>
+                <a:tc>
+                  <a:txBody>
+                    <a:bodyPr/>
+                    <a:lstStyle/>
+                    <a:p>
+                      <a:r>
+                        <a:rPr lang="en-US" sz="2400" dirty="0" smtClean="0"/>
+                        <a:t>41</a:t>
+                      </a:r>
+                      <a:endParaRPr lang="en-US" sz="2400" dirty="0"/>
+                    </a:p>
+                  </a:txBody>
+                  <a:tcPr/>
+                </a:tc>
+              </a:tr>
+            </a:tbl>
+          </a:graphicData>
+        </a:graphic>
+      </p:graphicFrame>
     </p:spTree>
     <p:extLst>
       <p:ext uri="{BB962C8B-B14F-4D97-AF65-F5344CB8AC3E}">
-        <p14:creationId xmlns:p14="http://schemas.microsoft.com/office/powerpoint/2010/main" val="811571513"/>
+        <p14:creationId xmlns:p14="http://schemas.microsoft.com/office/powerpoint/2010/main" val="125052133"/>
       </p:ext>
     </p:extLst>
   </p:cSld>
@@ -9488,15 +9981,7 @@
           <a:p>
             <a:r>
               <a:rPr lang="en-US" dirty="0" smtClean="0"/>
-              <a:t>Funding </a:t>
-            </a:r>
-            <a:r>
-              <a:rPr lang="en-US" dirty="0"/>
-              <a:t>type </a:t>
-            </a:r>
-            <a:r>
-              <a:rPr lang="en-US" dirty="0" smtClean="0"/>
-              <a:t>Total Funding Percentages </a:t>
+              <a:t>Funding Type by percentage</a:t>
             </a:r>
             <a:endParaRPr lang="en-US" dirty="0"/>
           </a:p>
@@ -9504,7 +9989,7 @@
       </p:sp>
       <p:pic>
         <p:nvPicPr>
-          <p:cNvPr id="6" name="Content Placeholder 5"/>
+          <p:cNvPr id="7" name="Content Placeholder 6"/>
           <p:cNvPicPr>
             <a:picLocks noGrp="1" noChangeAspect="1"/>
           </p:cNvPicPr>
@@ -9526,15 +10011,15 @@
         </p:blipFill>
         <p:spPr>
           <a:xfrm>
-            <a:off x="3383973" y="2214694"/>
-            <a:ext cx="5424053" cy="3812032"/>
+            <a:off x="3969327" y="2214695"/>
+            <a:ext cx="4384964" cy="3791250"/>
           </a:xfrm>
         </p:spPr>
       </p:pic>
     </p:spTree>
     <p:extLst>
       <p:ext uri="{BB962C8B-B14F-4D97-AF65-F5344CB8AC3E}">
-        <p14:creationId xmlns:p14="http://schemas.microsoft.com/office/powerpoint/2010/main" val="3584956998"/>
+        <p14:creationId xmlns:p14="http://schemas.microsoft.com/office/powerpoint/2010/main" val="811571513"/>
       </p:ext>
     </p:extLst>
   </p:cSld>

</xml_diff>